<commit_message>
Corrections, source code and image added.
</commit_message>
<xml_diff>
--- a/imgs/images.pptx
+++ b/imgs/images.pptx
@@ -4,9 +4,13 @@
   <p:sldMasterIdLst>
     <p:sldMasterId id="2147483648" r:id="rId1"/>
   </p:sldMasterIdLst>
+  <p:notesMasterIdLst>
+    <p:notesMasterId r:id="rId5"/>
+  </p:notesMasterIdLst>
   <p:sldIdLst>
     <p:sldId id="256" r:id="rId2"/>
     <p:sldId id="257" r:id="rId3"/>
+    <p:sldId id="258" r:id="rId4"/>
   </p:sldIdLst>
   <p:sldSz cx="12192000" cy="6858000"/>
   <p:notesSz cx="6858000" cy="9144000"/>
@@ -111,6 +115,439 @@
     </p:ext>
   </p:extLst>
 </p:presentation>
+</file>
+
+<file path=ppt/notesMasters/notesMaster1.xml><?xml version="1.0" encoding="utf-8"?>
+<p:notesMaster xmlns:a="http://schemas.openxmlformats.org/drawingml/2006/main" xmlns:r="http://schemas.openxmlformats.org/officeDocument/2006/relationships" xmlns:p="http://schemas.openxmlformats.org/presentationml/2006/main">
+  <p:cSld>
+    <p:bg>
+      <p:bgRef idx="1001">
+        <a:schemeClr val="bg1"/>
+      </p:bgRef>
+    </p:bg>
+    <p:spTree>
+      <p:nvGrpSpPr>
+        <p:cNvPr id="1" name=""/>
+        <p:cNvGrpSpPr/>
+        <p:nvPr/>
+      </p:nvGrpSpPr>
+      <p:grpSpPr>
+        <a:xfrm>
+          <a:off x="0" y="0"/>
+          <a:ext cx="0" cy="0"/>
+          <a:chOff x="0" y="0"/>
+          <a:chExt cx="0" cy="0"/>
+        </a:xfrm>
+      </p:grpSpPr>
+      <p:sp>
+        <p:nvSpPr>
+          <p:cNvPr id="2" name="Header Placeholder 1"/>
+          <p:cNvSpPr>
+            <a:spLocks noGrp="1"/>
+          </p:cNvSpPr>
+          <p:nvPr>
+            <p:ph type="hdr" sz="quarter"/>
+          </p:nvPr>
+        </p:nvSpPr>
+        <p:spPr>
+          <a:xfrm>
+            <a:off x="0" y="0"/>
+            <a:ext cx="2971800" cy="458788"/>
+          </a:xfrm>
+          <a:prstGeom prst="rect">
+            <a:avLst/>
+          </a:prstGeom>
+        </p:spPr>
+        <p:txBody>
+          <a:bodyPr vert="horz" lIns="91440" tIns="45720" rIns="91440" bIns="45720" rtlCol="0"/>
+          <a:lstStyle>
+            <a:lvl1pPr algn="l">
+              <a:defRPr sz="1200"/>
+            </a:lvl1pPr>
+          </a:lstStyle>
+          <a:p>
+            <a:endParaRPr lang="en-GB"/>
+          </a:p>
+        </p:txBody>
+      </p:sp>
+      <p:sp>
+        <p:nvSpPr>
+          <p:cNvPr id="3" name="Date Placeholder 2"/>
+          <p:cNvSpPr>
+            <a:spLocks noGrp="1"/>
+          </p:cNvSpPr>
+          <p:nvPr>
+            <p:ph type="dt" idx="1"/>
+          </p:nvPr>
+        </p:nvSpPr>
+        <p:spPr>
+          <a:xfrm>
+            <a:off x="3884613" y="0"/>
+            <a:ext cx="2971800" cy="458788"/>
+          </a:xfrm>
+          <a:prstGeom prst="rect">
+            <a:avLst/>
+          </a:prstGeom>
+        </p:spPr>
+        <p:txBody>
+          <a:bodyPr vert="horz" lIns="91440" tIns="45720" rIns="91440" bIns="45720" rtlCol="0"/>
+          <a:lstStyle>
+            <a:lvl1pPr algn="r">
+              <a:defRPr sz="1200"/>
+            </a:lvl1pPr>
+          </a:lstStyle>
+          <a:p>
+            <a:fld id="{3A552440-A9F1-9B40-BE29-1D667B302F42}" type="datetimeFigureOut">
+              <a:rPr lang="en-GB" smtClean="0"/>
+              <a:t>30/07/2025</a:t>
+            </a:fld>
+            <a:endParaRPr lang="en-GB"/>
+          </a:p>
+        </p:txBody>
+      </p:sp>
+      <p:sp>
+        <p:nvSpPr>
+          <p:cNvPr id="4" name="Slide Image Placeholder 3"/>
+          <p:cNvSpPr>
+            <a:spLocks noGrp="1" noRot="1" noChangeAspect="1"/>
+          </p:cNvSpPr>
+          <p:nvPr>
+            <p:ph type="sldImg" idx="2"/>
+          </p:nvPr>
+        </p:nvSpPr>
+        <p:spPr>
+          <a:xfrm>
+            <a:off x="685800" y="1143000"/>
+            <a:ext cx="5486400" cy="3086100"/>
+          </a:xfrm>
+          <a:prstGeom prst="rect">
+            <a:avLst/>
+          </a:prstGeom>
+          <a:noFill/>
+          <a:ln w="12700">
+            <a:solidFill>
+              <a:prstClr val="black"/>
+            </a:solidFill>
+          </a:ln>
+        </p:spPr>
+        <p:txBody>
+          <a:bodyPr vert="horz" lIns="91440" tIns="45720" rIns="91440" bIns="45720" rtlCol="0" anchor="ctr"/>
+          <a:lstStyle/>
+          <a:p>
+            <a:endParaRPr lang="en-GB"/>
+          </a:p>
+        </p:txBody>
+      </p:sp>
+      <p:sp>
+        <p:nvSpPr>
+          <p:cNvPr id="5" name="Notes Placeholder 4"/>
+          <p:cNvSpPr>
+            <a:spLocks noGrp="1"/>
+          </p:cNvSpPr>
+          <p:nvPr>
+            <p:ph type="body" sz="quarter" idx="3"/>
+          </p:nvPr>
+        </p:nvSpPr>
+        <p:spPr>
+          <a:xfrm>
+            <a:off x="685800" y="4400550"/>
+            <a:ext cx="5486400" cy="3600450"/>
+          </a:xfrm>
+          <a:prstGeom prst="rect">
+            <a:avLst/>
+          </a:prstGeom>
+        </p:spPr>
+        <p:txBody>
+          <a:bodyPr vert="horz" lIns="91440" tIns="45720" rIns="91440" bIns="45720" rtlCol="0"/>
+          <a:lstStyle/>
+          <a:p>
+            <a:pPr lvl="0"/>
+            <a:r>
+              <a:rPr lang="en-GB"/>
+              <a:t>Click to edit Master text styles</a:t>
+            </a:r>
+          </a:p>
+          <a:p>
+            <a:pPr lvl="1"/>
+            <a:r>
+              <a:rPr lang="en-GB"/>
+              <a:t>Second level</a:t>
+            </a:r>
+          </a:p>
+          <a:p>
+            <a:pPr lvl="2"/>
+            <a:r>
+              <a:rPr lang="en-GB"/>
+              <a:t>Third level</a:t>
+            </a:r>
+          </a:p>
+          <a:p>
+            <a:pPr lvl="3"/>
+            <a:r>
+              <a:rPr lang="en-GB"/>
+              <a:t>Fourth level</a:t>
+            </a:r>
+          </a:p>
+          <a:p>
+            <a:pPr lvl="4"/>
+            <a:r>
+              <a:rPr lang="en-GB"/>
+              <a:t>Fifth level</a:t>
+            </a:r>
+          </a:p>
+        </p:txBody>
+      </p:sp>
+      <p:sp>
+        <p:nvSpPr>
+          <p:cNvPr id="6" name="Footer Placeholder 5"/>
+          <p:cNvSpPr>
+            <a:spLocks noGrp="1"/>
+          </p:cNvSpPr>
+          <p:nvPr>
+            <p:ph type="ftr" sz="quarter" idx="4"/>
+          </p:nvPr>
+        </p:nvSpPr>
+        <p:spPr>
+          <a:xfrm>
+            <a:off x="0" y="8685213"/>
+            <a:ext cx="2971800" cy="458787"/>
+          </a:xfrm>
+          <a:prstGeom prst="rect">
+            <a:avLst/>
+          </a:prstGeom>
+        </p:spPr>
+        <p:txBody>
+          <a:bodyPr vert="horz" lIns="91440" tIns="45720" rIns="91440" bIns="45720" rtlCol="0" anchor="b"/>
+          <a:lstStyle>
+            <a:lvl1pPr algn="l">
+              <a:defRPr sz="1200"/>
+            </a:lvl1pPr>
+          </a:lstStyle>
+          <a:p>
+            <a:endParaRPr lang="en-GB"/>
+          </a:p>
+        </p:txBody>
+      </p:sp>
+      <p:sp>
+        <p:nvSpPr>
+          <p:cNvPr id="7" name="Slide Number Placeholder 6"/>
+          <p:cNvSpPr>
+            <a:spLocks noGrp="1"/>
+          </p:cNvSpPr>
+          <p:nvPr>
+            <p:ph type="sldNum" sz="quarter" idx="5"/>
+          </p:nvPr>
+        </p:nvSpPr>
+        <p:spPr>
+          <a:xfrm>
+            <a:off x="3884613" y="8685213"/>
+            <a:ext cx="2971800" cy="458787"/>
+          </a:xfrm>
+          <a:prstGeom prst="rect">
+            <a:avLst/>
+          </a:prstGeom>
+        </p:spPr>
+        <p:txBody>
+          <a:bodyPr vert="horz" lIns="91440" tIns="45720" rIns="91440" bIns="45720" rtlCol="0" anchor="b"/>
+          <a:lstStyle>
+            <a:lvl1pPr algn="r">
+              <a:defRPr sz="1200"/>
+            </a:lvl1pPr>
+          </a:lstStyle>
+          <a:p>
+            <a:fld id="{390BCC12-00AC-4D4C-881A-83AE6B26A1A4}" type="slidenum">
+              <a:rPr lang="en-GB" smtClean="0"/>
+              <a:t>‹#›</a:t>
+            </a:fld>
+            <a:endParaRPr lang="en-GB"/>
+          </a:p>
+        </p:txBody>
+      </p:sp>
+    </p:spTree>
+    <p:extLst>
+      <p:ext uri="{BB962C8B-B14F-4D97-AF65-F5344CB8AC3E}">
+        <p14:creationId xmlns:p14="http://schemas.microsoft.com/office/powerpoint/2010/main" val="4179031150"/>
+      </p:ext>
+    </p:extLst>
+  </p:cSld>
+  <p:clrMap bg1="lt1" tx1="dk1" bg2="lt2" tx2="dk2" accent1="accent1" accent2="accent2" accent3="accent3" accent4="accent4" accent5="accent5" accent6="accent6" hlink="hlink" folHlink="folHlink"/>
+  <p:notesStyle>
+    <a:lvl1pPr marL="0" algn="l" defTabSz="914400" rtl="0" eaLnBrk="1" latinLnBrk="0" hangingPunct="1">
+      <a:defRPr sz="1200" kern="1200">
+        <a:solidFill>
+          <a:schemeClr val="tx1"/>
+        </a:solidFill>
+        <a:latin typeface="+mn-lt"/>
+        <a:ea typeface="+mn-ea"/>
+        <a:cs typeface="+mn-cs"/>
+      </a:defRPr>
+    </a:lvl1pPr>
+    <a:lvl2pPr marL="457200" algn="l" defTabSz="914400" rtl="0" eaLnBrk="1" latinLnBrk="0" hangingPunct="1">
+      <a:defRPr sz="1200" kern="1200">
+        <a:solidFill>
+          <a:schemeClr val="tx1"/>
+        </a:solidFill>
+        <a:latin typeface="+mn-lt"/>
+        <a:ea typeface="+mn-ea"/>
+        <a:cs typeface="+mn-cs"/>
+      </a:defRPr>
+    </a:lvl2pPr>
+    <a:lvl3pPr marL="914400" algn="l" defTabSz="914400" rtl="0" eaLnBrk="1" latinLnBrk="0" hangingPunct="1">
+      <a:defRPr sz="1200" kern="1200">
+        <a:solidFill>
+          <a:schemeClr val="tx1"/>
+        </a:solidFill>
+        <a:latin typeface="+mn-lt"/>
+        <a:ea typeface="+mn-ea"/>
+        <a:cs typeface="+mn-cs"/>
+      </a:defRPr>
+    </a:lvl3pPr>
+    <a:lvl4pPr marL="1371600" algn="l" defTabSz="914400" rtl="0" eaLnBrk="1" latinLnBrk="0" hangingPunct="1">
+      <a:defRPr sz="1200" kern="1200">
+        <a:solidFill>
+          <a:schemeClr val="tx1"/>
+        </a:solidFill>
+        <a:latin typeface="+mn-lt"/>
+        <a:ea typeface="+mn-ea"/>
+        <a:cs typeface="+mn-cs"/>
+      </a:defRPr>
+    </a:lvl4pPr>
+    <a:lvl5pPr marL="1828800" algn="l" defTabSz="914400" rtl="0" eaLnBrk="1" latinLnBrk="0" hangingPunct="1">
+      <a:defRPr sz="1200" kern="1200">
+        <a:solidFill>
+          <a:schemeClr val="tx1"/>
+        </a:solidFill>
+        <a:latin typeface="+mn-lt"/>
+        <a:ea typeface="+mn-ea"/>
+        <a:cs typeface="+mn-cs"/>
+      </a:defRPr>
+    </a:lvl5pPr>
+    <a:lvl6pPr marL="2286000" algn="l" defTabSz="914400" rtl="0" eaLnBrk="1" latinLnBrk="0" hangingPunct="1">
+      <a:defRPr sz="1200" kern="1200">
+        <a:solidFill>
+          <a:schemeClr val="tx1"/>
+        </a:solidFill>
+        <a:latin typeface="+mn-lt"/>
+        <a:ea typeface="+mn-ea"/>
+        <a:cs typeface="+mn-cs"/>
+      </a:defRPr>
+    </a:lvl6pPr>
+    <a:lvl7pPr marL="2743200" algn="l" defTabSz="914400" rtl="0" eaLnBrk="1" latinLnBrk="0" hangingPunct="1">
+      <a:defRPr sz="1200" kern="1200">
+        <a:solidFill>
+          <a:schemeClr val="tx1"/>
+        </a:solidFill>
+        <a:latin typeface="+mn-lt"/>
+        <a:ea typeface="+mn-ea"/>
+        <a:cs typeface="+mn-cs"/>
+      </a:defRPr>
+    </a:lvl7pPr>
+    <a:lvl8pPr marL="3200400" algn="l" defTabSz="914400" rtl="0" eaLnBrk="1" latinLnBrk="0" hangingPunct="1">
+      <a:defRPr sz="1200" kern="1200">
+        <a:solidFill>
+          <a:schemeClr val="tx1"/>
+        </a:solidFill>
+        <a:latin typeface="+mn-lt"/>
+        <a:ea typeface="+mn-ea"/>
+        <a:cs typeface="+mn-cs"/>
+      </a:defRPr>
+    </a:lvl8pPr>
+    <a:lvl9pPr marL="3657600" algn="l" defTabSz="914400" rtl="0" eaLnBrk="1" latinLnBrk="0" hangingPunct="1">
+      <a:defRPr sz="1200" kern="1200">
+        <a:solidFill>
+          <a:schemeClr val="tx1"/>
+        </a:solidFill>
+        <a:latin typeface="+mn-lt"/>
+        <a:ea typeface="+mn-ea"/>
+        <a:cs typeface="+mn-cs"/>
+      </a:defRPr>
+    </a:lvl9pPr>
+  </p:notesStyle>
+</p:notesMaster>
+</file>
+
+<file path=ppt/notesSlides/notesSlide1.xml><?xml version="1.0" encoding="utf-8"?>
+<p:notes xmlns:a="http://schemas.openxmlformats.org/drawingml/2006/main" xmlns:r="http://schemas.openxmlformats.org/officeDocument/2006/relationships" xmlns:p="http://schemas.openxmlformats.org/presentationml/2006/main">
+  <p:cSld>
+    <p:spTree>
+      <p:nvGrpSpPr>
+        <p:cNvPr id="1" name=""/>
+        <p:cNvGrpSpPr/>
+        <p:nvPr/>
+      </p:nvGrpSpPr>
+      <p:grpSpPr>
+        <a:xfrm>
+          <a:off x="0" y="0"/>
+          <a:ext cx="0" cy="0"/>
+          <a:chOff x="0" y="0"/>
+          <a:chExt cx="0" cy="0"/>
+        </a:xfrm>
+      </p:grpSpPr>
+      <p:sp>
+        <p:nvSpPr>
+          <p:cNvPr id="2" name="Slide Image Placeholder 1"/>
+          <p:cNvSpPr>
+            <a:spLocks noGrp="1" noRot="1" noChangeAspect="1"/>
+          </p:cNvSpPr>
+          <p:nvPr>
+            <p:ph type="sldImg"/>
+          </p:nvPr>
+        </p:nvSpPr>
+        <p:spPr/>
+      </p:sp>
+      <p:sp>
+        <p:nvSpPr>
+          <p:cNvPr id="3" name="Notes Placeholder 2"/>
+          <p:cNvSpPr>
+            <a:spLocks noGrp="1"/>
+          </p:cNvSpPr>
+          <p:nvPr>
+            <p:ph type="body" idx="1"/>
+          </p:nvPr>
+        </p:nvSpPr>
+        <p:spPr/>
+        <p:txBody>
+          <a:bodyPr/>
+          <a:lstStyle/>
+          <a:p>
+            <a:endParaRPr lang="en-GB" dirty="0"/>
+          </a:p>
+        </p:txBody>
+      </p:sp>
+      <p:sp>
+        <p:nvSpPr>
+          <p:cNvPr id="4" name="Slide Number Placeholder 3"/>
+          <p:cNvSpPr>
+            <a:spLocks noGrp="1"/>
+          </p:cNvSpPr>
+          <p:nvPr>
+            <p:ph type="sldNum" sz="quarter" idx="5"/>
+          </p:nvPr>
+        </p:nvSpPr>
+        <p:spPr/>
+        <p:txBody>
+          <a:bodyPr/>
+          <a:lstStyle/>
+          <a:p>
+            <a:fld id="{390BCC12-00AC-4D4C-881A-83AE6B26A1A4}" type="slidenum">
+              <a:rPr lang="en-GB" smtClean="0"/>
+              <a:t>3</a:t>
+            </a:fld>
+            <a:endParaRPr lang="en-GB"/>
+          </a:p>
+        </p:txBody>
+      </p:sp>
+    </p:spTree>
+    <p:extLst>
+      <p:ext uri="{BB962C8B-B14F-4D97-AF65-F5344CB8AC3E}">
+        <p14:creationId xmlns:p14="http://schemas.microsoft.com/office/powerpoint/2010/main" val="2260727322"/>
+      </p:ext>
+    </p:extLst>
+  </p:cSld>
+  <p:clrMapOvr>
+    <a:masterClrMapping/>
+  </p:clrMapOvr>
+</p:notes>
 </file>
 
 <file path=ppt/slideLayouts/slideLayout1.xml><?xml version="1.0" encoding="utf-8"?>
@@ -3941,6 +4378,829 @@
 </p:sld>
 </file>
 
+<file path=ppt/slides/slide3.xml><?xml version="1.0" encoding="utf-8"?>
+<p:sld xmlns:a="http://schemas.openxmlformats.org/drawingml/2006/main" xmlns:r="http://schemas.openxmlformats.org/officeDocument/2006/relationships" xmlns:p="http://schemas.openxmlformats.org/presentationml/2006/main">
+  <p:cSld>
+    <p:spTree>
+      <p:nvGrpSpPr>
+        <p:cNvPr id="1" name=""/>
+        <p:cNvGrpSpPr/>
+        <p:nvPr/>
+      </p:nvGrpSpPr>
+      <p:grpSpPr>
+        <a:xfrm>
+          <a:off x="0" y="0"/>
+          <a:ext cx="0" cy="0"/>
+          <a:chOff x="0" y="0"/>
+          <a:chExt cx="0" cy="0"/>
+        </a:xfrm>
+      </p:grpSpPr>
+      <p:grpSp>
+        <p:nvGrpSpPr>
+          <p:cNvPr id="21" name="Group 20">
+            <a:extLst>
+              <a:ext uri="{FF2B5EF4-FFF2-40B4-BE49-F238E27FC236}">
+                <a16:creationId xmlns:a16="http://schemas.microsoft.com/office/drawing/2014/main" id="{F8D287AE-DEAA-CF14-D67B-843763FA4F52}"/>
+              </a:ext>
+            </a:extLst>
+          </p:cNvPr>
+          <p:cNvGrpSpPr/>
+          <p:nvPr/>
+        </p:nvGrpSpPr>
+        <p:grpSpPr>
+          <a:xfrm>
+            <a:off x="1405350" y="1711144"/>
+            <a:ext cx="10755492" cy="4078728"/>
+            <a:chOff x="1405350" y="1711144"/>
+            <a:chExt cx="10755492" cy="4078728"/>
+          </a:xfrm>
+        </p:grpSpPr>
+        <p:sp>
+          <p:nvSpPr>
+            <p:cNvPr id="5" name="Rectangle 4">
+              <a:extLst>
+                <a:ext uri="{FF2B5EF4-FFF2-40B4-BE49-F238E27FC236}">
+                  <a16:creationId xmlns:a16="http://schemas.microsoft.com/office/drawing/2014/main" id="{67139F16-1705-2550-7031-AD72624F8F6F}"/>
+                </a:ext>
+              </a:extLst>
+            </p:cNvPr>
+            <p:cNvSpPr/>
+            <p:nvPr/>
+          </p:nvSpPr>
+          <p:spPr>
+            <a:xfrm>
+              <a:off x="4607617" y="2183215"/>
+              <a:ext cx="3898605" cy="3076355"/>
+            </a:xfrm>
+            <a:prstGeom prst="rect">
+              <a:avLst/>
+            </a:prstGeom>
+          </p:spPr>
+          <p:style>
+            <a:lnRef idx="2">
+              <a:schemeClr val="accent1">
+                <a:shade val="15000"/>
+              </a:schemeClr>
+            </a:lnRef>
+            <a:fillRef idx="1">
+              <a:schemeClr val="accent1"/>
+            </a:fillRef>
+            <a:effectRef idx="0">
+              <a:schemeClr val="accent1"/>
+            </a:effectRef>
+            <a:fontRef idx="minor">
+              <a:schemeClr val="lt1"/>
+            </a:fontRef>
+          </p:style>
+          <p:txBody>
+            <a:bodyPr rtlCol="0" anchor="ctr"/>
+            <a:lstStyle/>
+            <a:p>
+              <a:pPr algn="ctr"/>
+              <a:endParaRPr lang="en-GB"/>
+            </a:p>
+          </p:txBody>
+        </p:sp>
+        <p:sp>
+          <p:nvSpPr>
+            <p:cNvPr id="2" name="TextBox 1">
+              <a:extLst>
+                <a:ext uri="{FF2B5EF4-FFF2-40B4-BE49-F238E27FC236}">
+                  <a16:creationId xmlns:a16="http://schemas.microsoft.com/office/drawing/2014/main" id="{FD4030D0-E1AA-73BA-7339-B2DB49AF8CD7}"/>
+                </a:ext>
+              </a:extLst>
+            </p:cNvPr>
+            <p:cNvSpPr txBox="1"/>
+            <p:nvPr/>
+          </p:nvSpPr>
+          <p:spPr>
+            <a:xfrm>
+              <a:off x="1405350" y="1711144"/>
+              <a:ext cx="5873916" cy="369332"/>
+            </a:xfrm>
+            <a:prstGeom prst="rect">
+              <a:avLst/>
+            </a:prstGeom>
+            <a:noFill/>
+            <a:ln>
+              <a:solidFill>
+                <a:schemeClr val="accent1"/>
+              </a:solidFill>
+            </a:ln>
+          </p:spPr>
+          <p:txBody>
+            <a:bodyPr wrap="none" rtlCol="0">
+              <a:spAutoFit/>
+            </a:bodyPr>
+            <a:lstStyle/>
+            <a:p>
+              <a:r>
+                <a:rPr lang="en-GB" dirty="0" err="1"/>
+                <a:t>MPI_Send</a:t>
+              </a:r>
+              <a:r>
+                <a:rPr lang="en-GB" dirty="0"/>
+                <a:t>( &amp;</a:t>
+              </a:r>
+              <a:r>
+                <a:rPr lang="en-GB" dirty="0" err="1"/>
+                <a:t>val</a:t>
+              </a:r>
+              <a:r>
+                <a:rPr lang="en-GB" dirty="0"/>
+                <a:t>, 1, Datatype, 1, tag, MPI_COMM_WORLD) </a:t>
+              </a:r>
+            </a:p>
+          </p:txBody>
+        </p:sp>
+        <p:sp>
+          <p:nvSpPr>
+            <p:cNvPr id="3" name="Oval 2">
+              <a:extLst>
+                <a:ext uri="{FF2B5EF4-FFF2-40B4-BE49-F238E27FC236}">
+                  <a16:creationId xmlns:a16="http://schemas.microsoft.com/office/drawing/2014/main" id="{D44074A0-5378-8393-48E8-E8112DB5D3CA}"/>
+                </a:ext>
+              </a:extLst>
+            </p:cNvPr>
+            <p:cNvSpPr/>
+            <p:nvPr/>
+          </p:nvSpPr>
+          <p:spPr>
+            <a:xfrm>
+              <a:off x="5067151" y="2769779"/>
+              <a:ext cx="503274" cy="439479"/>
+            </a:xfrm>
+            <a:prstGeom prst="ellipse">
+              <a:avLst/>
+            </a:prstGeom>
+            <a:solidFill>
+              <a:srgbClr val="FF0000"/>
+            </a:solidFill>
+          </p:spPr>
+          <p:style>
+            <a:lnRef idx="2">
+              <a:schemeClr val="accent1">
+                <a:shade val="15000"/>
+              </a:schemeClr>
+            </a:lnRef>
+            <a:fillRef idx="1">
+              <a:schemeClr val="accent1"/>
+            </a:fillRef>
+            <a:effectRef idx="0">
+              <a:schemeClr val="accent1"/>
+            </a:effectRef>
+            <a:fontRef idx="minor">
+              <a:schemeClr val="lt1"/>
+            </a:fontRef>
+          </p:style>
+          <p:txBody>
+            <a:bodyPr rtlCol="0" anchor="ctr"/>
+            <a:lstStyle/>
+            <a:p>
+              <a:pPr algn="ctr"/>
+              <a:r>
+                <a:rPr lang="en-GB" dirty="0"/>
+                <a:t>0</a:t>
+              </a:r>
+            </a:p>
+          </p:txBody>
+        </p:sp>
+        <p:sp>
+          <p:nvSpPr>
+            <p:cNvPr id="4" name="Oval 3">
+              <a:extLst>
+                <a:ext uri="{FF2B5EF4-FFF2-40B4-BE49-F238E27FC236}">
+                  <a16:creationId xmlns:a16="http://schemas.microsoft.com/office/drawing/2014/main" id="{FFA81BD9-B421-3C67-E6D9-F894E06A979E}"/>
+                </a:ext>
+              </a:extLst>
+            </p:cNvPr>
+            <p:cNvSpPr/>
+            <p:nvPr/>
+          </p:nvSpPr>
+          <p:spPr>
+            <a:xfrm>
+              <a:off x="7438397" y="4384417"/>
+              <a:ext cx="437357" cy="439479"/>
+            </a:xfrm>
+            <a:prstGeom prst="ellipse">
+              <a:avLst/>
+            </a:prstGeom>
+            <a:solidFill>
+              <a:srgbClr val="FF0000"/>
+            </a:solidFill>
+          </p:spPr>
+          <p:style>
+            <a:lnRef idx="2">
+              <a:schemeClr val="accent1">
+                <a:shade val="15000"/>
+              </a:schemeClr>
+            </a:lnRef>
+            <a:fillRef idx="1">
+              <a:schemeClr val="accent1"/>
+            </a:fillRef>
+            <a:effectRef idx="0">
+              <a:schemeClr val="accent1"/>
+            </a:effectRef>
+            <a:fontRef idx="minor">
+              <a:schemeClr val="lt1"/>
+            </a:fontRef>
+          </p:style>
+          <p:txBody>
+            <a:bodyPr rtlCol="0" anchor="ctr"/>
+            <a:lstStyle/>
+            <a:p>
+              <a:pPr algn="ctr"/>
+              <a:r>
+                <a:rPr lang="en-GB" dirty="0"/>
+                <a:t>1</a:t>
+              </a:r>
+            </a:p>
+          </p:txBody>
+        </p:sp>
+        <p:sp>
+          <p:nvSpPr>
+            <p:cNvPr id="6" name="Right Arrow 5">
+              <a:extLst>
+                <a:ext uri="{FF2B5EF4-FFF2-40B4-BE49-F238E27FC236}">
+                  <a16:creationId xmlns:a16="http://schemas.microsoft.com/office/drawing/2014/main" id="{6680111F-763B-342B-36D2-09FC10AE25C8}"/>
+                </a:ext>
+              </a:extLst>
+            </p:cNvPr>
+            <p:cNvSpPr/>
+            <p:nvPr/>
+          </p:nvSpPr>
+          <p:spPr>
+            <a:xfrm rot="2005667">
+              <a:off x="5782700" y="3519224"/>
+              <a:ext cx="1342320" cy="484632"/>
+            </a:xfrm>
+            <a:prstGeom prst="rightArrow">
+              <a:avLst/>
+            </a:prstGeom>
+            <a:solidFill>
+              <a:srgbClr val="FF0000"/>
+            </a:solidFill>
+          </p:spPr>
+          <p:style>
+            <a:lnRef idx="2">
+              <a:schemeClr val="accent1">
+                <a:shade val="15000"/>
+              </a:schemeClr>
+            </a:lnRef>
+            <a:fillRef idx="1">
+              <a:schemeClr val="accent1"/>
+            </a:fillRef>
+            <a:effectRef idx="0">
+              <a:schemeClr val="accent1"/>
+            </a:effectRef>
+            <a:fontRef idx="minor">
+              <a:schemeClr val="lt1"/>
+            </a:fontRef>
+          </p:style>
+          <p:txBody>
+            <a:bodyPr rtlCol="0" anchor="ctr"/>
+            <a:lstStyle/>
+            <a:p>
+              <a:pPr algn="ctr"/>
+              <a:endParaRPr lang="en-GB"/>
+            </a:p>
+          </p:txBody>
+        </p:sp>
+        <p:grpSp>
+          <p:nvGrpSpPr>
+            <p:cNvPr id="10" name="Group 9">
+              <a:extLst>
+                <a:ext uri="{FF2B5EF4-FFF2-40B4-BE49-F238E27FC236}">
+                  <a16:creationId xmlns:a16="http://schemas.microsoft.com/office/drawing/2014/main" id="{0E695352-7C3F-BCA4-9F98-5E1E8D5BB260}"/>
+                </a:ext>
+              </a:extLst>
+            </p:cNvPr>
+            <p:cNvGrpSpPr/>
+            <p:nvPr/>
+          </p:nvGrpSpPr>
+          <p:grpSpPr>
+            <a:xfrm rot="2043844">
+              <a:off x="5516718" y="3058090"/>
+              <a:ext cx="429755" cy="429755"/>
+              <a:chOff x="3601553" y="3721392"/>
+              <a:chExt cx="429755" cy="429755"/>
+            </a:xfrm>
+          </p:grpSpPr>
+          <p:sp>
+            <p:nvSpPr>
+              <p:cNvPr id="9" name="Rectangle 8">
+                <a:extLst>
+                  <a:ext uri="{FF2B5EF4-FFF2-40B4-BE49-F238E27FC236}">
+                    <a16:creationId xmlns:a16="http://schemas.microsoft.com/office/drawing/2014/main" id="{0C16ED4A-D84C-E296-5956-B11E17E9C920}"/>
+                  </a:ext>
+                </a:extLst>
+              </p:cNvPr>
+              <p:cNvSpPr/>
+              <p:nvPr/>
+            </p:nvSpPr>
+            <p:spPr>
+              <a:xfrm>
+                <a:off x="3650512" y="3806456"/>
+                <a:ext cx="340241" cy="248093"/>
+              </a:xfrm>
+              <a:prstGeom prst="rect">
+                <a:avLst/>
+              </a:prstGeom>
+              <a:solidFill>
+                <a:schemeClr val="bg1"/>
+              </a:solidFill>
+            </p:spPr>
+            <p:style>
+              <a:lnRef idx="2">
+                <a:schemeClr val="accent1">
+                  <a:shade val="15000"/>
+                </a:schemeClr>
+              </a:lnRef>
+              <a:fillRef idx="1">
+                <a:schemeClr val="accent1"/>
+              </a:fillRef>
+              <a:effectRef idx="0">
+                <a:schemeClr val="accent1"/>
+              </a:effectRef>
+              <a:fontRef idx="minor">
+                <a:schemeClr val="lt1"/>
+              </a:fontRef>
+            </p:style>
+            <p:txBody>
+              <a:bodyPr rtlCol="0" anchor="ctr"/>
+              <a:lstStyle/>
+              <a:p>
+                <a:pPr algn="ctr"/>
+                <a:endParaRPr lang="en-GB"/>
+              </a:p>
+            </p:txBody>
+          </p:sp>
+          <p:pic>
+            <p:nvPicPr>
+              <p:cNvPr id="8" name="Graphic 7" descr="Envelope outline">
+                <a:extLst>
+                  <a:ext uri="{FF2B5EF4-FFF2-40B4-BE49-F238E27FC236}">
+                    <a16:creationId xmlns:a16="http://schemas.microsoft.com/office/drawing/2014/main" id="{9B78FF74-9294-AECA-BE1A-5237A7B1F380}"/>
+                  </a:ext>
+                </a:extLst>
+              </p:cNvPr>
+              <p:cNvPicPr>
+                <a:picLocks noChangeAspect="1"/>
+              </p:cNvPicPr>
+              <p:nvPr/>
+            </p:nvPicPr>
+            <p:blipFill>
+              <a:blip r:embed="rId3">
+                <a:extLst>
+                  <a:ext uri="{96DAC541-7B7A-43D3-8B79-37D633B846F1}">
+                    <asvg:svgBlip xmlns:asvg="http://schemas.microsoft.com/office/drawing/2016/SVG/main" r:embed="rId4"/>
+                  </a:ext>
+                </a:extLst>
+              </a:blip>
+              <a:stretch>
+                <a:fillRect/>
+              </a:stretch>
+            </p:blipFill>
+            <p:spPr>
+              <a:xfrm>
+                <a:off x="3601553" y="3721392"/>
+                <a:ext cx="429755" cy="429755"/>
+              </a:xfrm>
+              <a:prstGeom prst="rect">
+                <a:avLst/>
+              </a:prstGeom>
+            </p:spPr>
+          </p:pic>
+        </p:grpSp>
+        <p:grpSp>
+          <p:nvGrpSpPr>
+            <p:cNvPr id="19" name="Group 18">
+              <a:extLst>
+                <a:ext uri="{FF2B5EF4-FFF2-40B4-BE49-F238E27FC236}">
+                  <a16:creationId xmlns:a16="http://schemas.microsoft.com/office/drawing/2014/main" id="{33A86E05-8EE4-51DB-3A7A-387A483F1017}"/>
+                </a:ext>
+              </a:extLst>
+            </p:cNvPr>
+            <p:cNvGrpSpPr/>
+            <p:nvPr/>
+          </p:nvGrpSpPr>
+          <p:grpSpPr>
+            <a:xfrm rot="2227015">
+              <a:off x="6992808" y="3939694"/>
+              <a:ext cx="572916" cy="731560"/>
+              <a:chOff x="4518831" y="4151861"/>
+              <a:chExt cx="914400" cy="914400"/>
+            </a:xfrm>
+          </p:grpSpPr>
+          <p:grpSp>
+            <p:nvGrpSpPr>
+              <p:cNvPr id="18" name="Group 17">
+                <a:extLst>
+                  <a:ext uri="{FF2B5EF4-FFF2-40B4-BE49-F238E27FC236}">
+                    <a16:creationId xmlns:a16="http://schemas.microsoft.com/office/drawing/2014/main" id="{8CBB0959-AB1A-2C13-8082-B7EBEA542B2D}"/>
+                  </a:ext>
+                </a:extLst>
+              </p:cNvPr>
+              <p:cNvGrpSpPr/>
+              <p:nvPr/>
+            </p:nvGrpSpPr>
+            <p:grpSpPr>
+              <a:xfrm>
+                <a:off x="4648198" y="4269267"/>
+                <a:ext cx="669925" cy="663575"/>
+                <a:chOff x="4648198" y="4269267"/>
+                <a:chExt cx="669925" cy="663575"/>
+              </a:xfrm>
+            </p:grpSpPr>
+            <p:sp>
+              <p:nvSpPr>
+                <p:cNvPr id="15" name="Rectangle 14">
+                  <a:extLst>
+                    <a:ext uri="{FF2B5EF4-FFF2-40B4-BE49-F238E27FC236}">
+                      <a16:creationId xmlns:a16="http://schemas.microsoft.com/office/drawing/2014/main" id="{8FEAA1A4-9FFD-4F0E-D3BA-981621E9D0B0}"/>
+                    </a:ext>
+                  </a:extLst>
+                </p:cNvPr>
+                <p:cNvSpPr/>
+                <p:nvPr/>
+              </p:nvSpPr>
+              <p:spPr>
+                <a:xfrm>
+                  <a:off x="5061457" y="4269267"/>
+                  <a:ext cx="130175" cy="79375"/>
+                </a:xfrm>
+                <a:prstGeom prst="rect">
+                  <a:avLst/>
+                </a:prstGeom>
+                <a:solidFill>
+                  <a:schemeClr val="bg1"/>
+                </a:solidFill>
+                <a:ln>
+                  <a:noFill/>
+                </a:ln>
+              </p:spPr>
+              <p:style>
+                <a:lnRef idx="2">
+                  <a:schemeClr val="accent1">
+                    <a:shade val="15000"/>
+                  </a:schemeClr>
+                </a:lnRef>
+                <a:fillRef idx="1">
+                  <a:schemeClr val="accent1"/>
+                </a:fillRef>
+                <a:effectRef idx="0">
+                  <a:schemeClr val="accent1"/>
+                </a:effectRef>
+                <a:fontRef idx="minor">
+                  <a:schemeClr val="lt1"/>
+                </a:fontRef>
+              </p:style>
+              <p:txBody>
+                <a:bodyPr rtlCol="0" anchor="ctr"/>
+                <a:lstStyle/>
+                <a:p>
+                  <a:pPr algn="ctr"/>
+                  <a:endParaRPr lang="en-GB"/>
+                </a:p>
+              </p:txBody>
+            </p:sp>
+            <p:sp>
+              <p:nvSpPr>
+                <p:cNvPr id="13" name="Rounded Rectangle 12">
+                  <a:extLst>
+                    <a:ext uri="{FF2B5EF4-FFF2-40B4-BE49-F238E27FC236}">
+                      <a16:creationId xmlns:a16="http://schemas.microsoft.com/office/drawing/2014/main" id="{282EF717-E1FF-1D5E-4056-52A1B5B27DF2}"/>
+                    </a:ext>
+                  </a:extLst>
+                </p:cNvPr>
+                <p:cNvSpPr/>
+                <p:nvPr/>
+              </p:nvSpPr>
+              <p:spPr>
+                <a:xfrm>
+                  <a:off x="4648198" y="4413250"/>
+                  <a:ext cx="669925" cy="402113"/>
+                </a:xfrm>
+                <a:custGeom>
+                  <a:avLst/>
+                  <a:gdLst>
+                    <a:gd name="connsiteX0" fmla="*/ 0 w 635000"/>
+                    <a:gd name="connsiteY0" fmla="*/ 90635 h 396876"/>
+                    <a:gd name="connsiteX1" fmla="*/ 90635 w 635000"/>
+                    <a:gd name="connsiteY1" fmla="*/ 0 h 396876"/>
+                    <a:gd name="connsiteX2" fmla="*/ 544365 w 635000"/>
+                    <a:gd name="connsiteY2" fmla="*/ 0 h 396876"/>
+                    <a:gd name="connsiteX3" fmla="*/ 635000 w 635000"/>
+                    <a:gd name="connsiteY3" fmla="*/ 90635 h 396876"/>
+                    <a:gd name="connsiteX4" fmla="*/ 635000 w 635000"/>
+                    <a:gd name="connsiteY4" fmla="*/ 306241 h 396876"/>
+                    <a:gd name="connsiteX5" fmla="*/ 544365 w 635000"/>
+                    <a:gd name="connsiteY5" fmla="*/ 396876 h 396876"/>
+                    <a:gd name="connsiteX6" fmla="*/ 90635 w 635000"/>
+                    <a:gd name="connsiteY6" fmla="*/ 396876 h 396876"/>
+                    <a:gd name="connsiteX7" fmla="*/ 0 w 635000"/>
+                    <a:gd name="connsiteY7" fmla="*/ 306241 h 396876"/>
+                    <a:gd name="connsiteX8" fmla="*/ 0 w 635000"/>
+                    <a:gd name="connsiteY8" fmla="*/ 90635 h 396876"/>
+                    <a:gd name="connsiteX0" fmla="*/ 9525 w 644525"/>
+                    <a:gd name="connsiteY0" fmla="*/ 90635 h 402113"/>
+                    <a:gd name="connsiteX1" fmla="*/ 100160 w 644525"/>
+                    <a:gd name="connsiteY1" fmla="*/ 0 h 402113"/>
+                    <a:gd name="connsiteX2" fmla="*/ 553890 w 644525"/>
+                    <a:gd name="connsiteY2" fmla="*/ 0 h 402113"/>
+                    <a:gd name="connsiteX3" fmla="*/ 644525 w 644525"/>
+                    <a:gd name="connsiteY3" fmla="*/ 90635 h 402113"/>
+                    <a:gd name="connsiteX4" fmla="*/ 644525 w 644525"/>
+                    <a:gd name="connsiteY4" fmla="*/ 306241 h 402113"/>
+                    <a:gd name="connsiteX5" fmla="*/ 553890 w 644525"/>
+                    <a:gd name="connsiteY5" fmla="*/ 396876 h 402113"/>
+                    <a:gd name="connsiteX6" fmla="*/ 100160 w 644525"/>
+                    <a:gd name="connsiteY6" fmla="*/ 396876 h 402113"/>
+                    <a:gd name="connsiteX7" fmla="*/ 0 w 644525"/>
+                    <a:gd name="connsiteY7" fmla="*/ 369741 h 402113"/>
+                    <a:gd name="connsiteX8" fmla="*/ 9525 w 644525"/>
+                    <a:gd name="connsiteY8" fmla="*/ 90635 h 402113"/>
+                    <a:gd name="connsiteX0" fmla="*/ 9525 w 669925"/>
+                    <a:gd name="connsiteY0" fmla="*/ 90635 h 402113"/>
+                    <a:gd name="connsiteX1" fmla="*/ 100160 w 669925"/>
+                    <a:gd name="connsiteY1" fmla="*/ 0 h 402113"/>
+                    <a:gd name="connsiteX2" fmla="*/ 553890 w 669925"/>
+                    <a:gd name="connsiteY2" fmla="*/ 0 h 402113"/>
+                    <a:gd name="connsiteX3" fmla="*/ 644525 w 669925"/>
+                    <a:gd name="connsiteY3" fmla="*/ 90635 h 402113"/>
+                    <a:gd name="connsiteX4" fmla="*/ 669925 w 669925"/>
+                    <a:gd name="connsiteY4" fmla="*/ 344341 h 402113"/>
+                    <a:gd name="connsiteX5" fmla="*/ 553890 w 669925"/>
+                    <a:gd name="connsiteY5" fmla="*/ 396876 h 402113"/>
+                    <a:gd name="connsiteX6" fmla="*/ 100160 w 669925"/>
+                    <a:gd name="connsiteY6" fmla="*/ 396876 h 402113"/>
+                    <a:gd name="connsiteX7" fmla="*/ 0 w 669925"/>
+                    <a:gd name="connsiteY7" fmla="*/ 369741 h 402113"/>
+                    <a:gd name="connsiteX8" fmla="*/ 9525 w 669925"/>
+                    <a:gd name="connsiteY8" fmla="*/ 90635 h 402113"/>
+                  </a:gdLst>
+                  <a:ahLst/>
+                  <a:cxnLst>
+                    <a:cxn ang="0">
+                      <a:pos x="connsiteX0" y="connsiteY0"/>
+                    </a:cxn>
+                    <a:cxn ang="0">
+                      <a:pos x="connsiteX1" y="connsiteY1"/>
+                    </a:cxn>
+                    <a:cxn ang="0">
+                      <a:pos x="connsiteX2" y="connsiteY2"/>
+                    </a:cxn>
+                    <a:cxn ang="0">
+                      <a:pos x="connsiteX3" y="connsiteY3"/>
+                    </a:cxn>
+                    <a:cxn ang="0">
+                      <a:pos x="connsiteX4" y="connsiteY4"/>
+                    </a:cxn>
+                    <a:cxn ang="0">
+                      <a:pos x="connsiteX5" y="connsiteY5"/>
+                    </a:cxn>
+                    <a:cxn ang="0">
+                      <a:pos x="connsiteX6" y="connsiteY6"/>
+                    </a:cxn>
+                    <a:cxn ang="0">
+                      <a:pos x="connsiteX7" y="connsiteY7"/>
+                    </a:cxn>
+                    <a:cxn ang="0">
+                      <a:pos x="connsiteX8" y="connsiteY8"/>
+                    </a:cxn>
+                  </a:cxnLst>
+                  <a:rect l="l" t="t" r="r" b="b"/>
+                  <a:pathLst>
+                    <a:path w="669925" h="402113">
+                      <a:moveTo>
+                        <a:pt x="9525" y="90635"/>
+                      </a:moveTo>
+                      <a:cubicBezTo>
+                        <a:pt x="9525" y="40579"/>
+                        <a:pt x="50104" y="0"/>
+                        <a:pt x="100160" y="0"/>
+                      </a:cubicBezTo>
+                      <a:lnTo>
+                        <a:pt x="553890" y="0"/>
+                      </a:lnTo>
+                      <a:cubicBezTo>
+                        <a:pt x="603946" y="0"/>
+                        <a:pt x="644525" y="40579"/>
+                        <a:pt x="644525" y="90635"/>
+                      </a:cubicBezTo>
+                      <a:lnTo>
+                        <a:pt x="669925" y="344341"/>
+                      </a:lnTo>
+                      <a:cubicBezTo>
+                        <a:pt x="669925" y="394397"/>
+                        <a:pt x="603946" y="396876"/>
+                        <a:pt x="553890" y="396876"/>
+                      </a:cubicBezTo>
+                      <a:lnTo>
+                        <a:pt x="100160" y="396876"/>
+                      </a:lnTo>
+                      <a:cubicBezTo>
+                        <a:pt x="50104" y="396876"/>
+                        <a:pt x="0" y="419797"/>
+                        <a:pt x="0" y="369741"/>
+                      </a:cubicBezTo>
+                      <a:cubicBezTo>
+                        <a:pt x="0" y="297872"/>
+                        <a:pt x="9525" y="162504"/>
+                        <a:pt x="9525" y="90635"/>
+                      </a:cubicBezTo>
+                      <a:close/>
+                    </a:path>
+                  </a:pathLst>
+                </a:custGeom>
+                <a:solidFill>
+                  <a:schemeClr val="bg1"/>
+                </a:solidFill>
+                <a:ln>
+                  <a:noFill/>
+                </a:ln>
+              </p:spPr>
+              <p:style>
+                <a:lnRef idx="2">
+                  <a:schemeClr val="accent1">
+                    <a:shade val="15000"/>
+                  </a:schemeClr>
+                </a:lnRef>
+                <a:fillRef idx="1">
+                  <a:schemeClr val="accent1"/>
+                </a:fillRef>
+                <a:effectRef idx="0">
+                  <a:schemeClr val="accent1"/>
+                </a:effectRef>
+                <a:fontRef idx="minor">
+                  <a:schemeClr val="lt1"/>
+                </a:fontRef>
+              </p:style>
+              <p:txBody>
+                <a:bodyPr rtlCol="0" anchor="ctr"/>
+                <a:lstStyle/>
+                <a:p>
+                  <a:pPr algn="ctr"/>
+                  <a:endParaRPr lang="en-GB"/>
+                </a:p>
+              </p:txBody>
+            </p:sp>
+            <p:sp>
+              <p:nvSpPr>
+                <p:cNvPr id="14" name="Rounded Rectangle 13">
+                  <a:extLst>
+                    <a:ext uri="{FF2B5EF4-FFF2-40B4-BE49-F238E27FC236}">
+                      <a16:creationId xmlns:a16="http://schemas.microsoft.com/office/drawing/2014/main" id="{678B13A4-0919-FD96-0907-7F7C001EE6FD}"/>
+                    </a:ext>
+                  </a:extLst>
+                </p:cNvPr>
+                <p:cNvSpPr/>
+                <p:nvPr/>
+              </p:nvSpPr>
+              <p:spPr>
+                <a:xfrm>
+                  <a:off x="4953508" y="4774092"/>
+                  <a:ext cx="57150" cy="158750"/>
+                </a:xfrm>
+                <a:prstGeom prst="roundRect">
+                  <a:avLst/>
+                </a:prstGeom>
+                <a:solidFill>
+                  <a:schemeClr val="bg1"/>
+                </a:solidFill>
+                <a:ln>
+                  <a:noFill/>
+                </a:ln>
+              </p:spPr>
+              <p:style>
+                <a:lnRef idx="2">
+                  <a:schemeClr val="accent1">
+                    <a:shade val="15000"/>
+                  </a:schemeClr>
+                </a:lnRef>
+                <a:fillRef idx="1">
+                  <a:schemeClr val="accent1"/>
+                </a:fillRef>
+                <a:effectRef idx="0">
+                  <a:schemeClr val="accent1"/>
+                </a:effectRef>
+                <a:fontRef idx="minor">
+                  <a:schemeClr val="lt1"/>
+                </a:fontRef>
+              </p:style>
+              <p:txBody>
+                <a:bodyPr rtlCol="0" anchor="ctr"/>
+                <a:lstStyle/>
+                <a:p>
+                  <a:pPr algn="ctr"/>
+                  <a:endParaRPr lang="en-GB"/>
+                </a:p>
+              </p:txBody>
+            </p:sp>
+          </p:grpSp>
+          <p:pic>
+            <p:nvPicPr>
+              <p:cNvPr id="12" name="Graphic 11" descr="Mailbox outline">
+                <a:extLst>
+                  <a:ext uri="{FF2B5EF4-FFF2-40B4-BE49-F238E27FC236}">
+                    <a16:creationId xmlns:a16="http://schemas.microsoft.com/office/drawing/2014/main" id="{CF443059-DC91-B750-75B7-EFBEC9BC34E7}"/>
+                  </a:ext>
+                </a:extLst>
+              </p:cNvPr>
+              <p:cNvPicPr>
+                <a:picLocks noChangeAspect="1"/>
+              </p:cNvPicPr>
+              <p:nvPr/>
+            </p:nvPicPr>
+            <p:blipFill>
+              <a:blip r:embed="rId5">
+                <a:extLst>
+                  <a:ext uri="{96DAC541-7B7A-43D3-8B79-37D633B846F1}">
+                    <asvg:svgBlip xmlns:asvg="http://schemas.microsoft.com/office/drawing/2016/SVG/main" r:embed="rId6"/>
+                  </a:ext>
+                </a:extLst>
+              </a:blip>
+              <a:stretch>
+                <a:fillRect/>
+              </a:stretch>
+            </p:blipFill>
+            <p:spPr>
+              <a:xfrm>
+                <a:off x="4518831" y="4151861"/>
+                <a:ext cx="914400" cy="914400"/>
+              </a:xfrm>
+              <a:prstGeom prst="rect">
+                <a:avLst/>
+              </a:prstGeom>
+            </p:spPr>
+          </p:pic>
+        </p:grpSp>
+        <p:sp>
+          <p:nvSpPr>
+            <p:cNvPr id="20" name="TextBox 19">
+              <a:extLst>
+                <a:ext uri="{FF2B5EF4-FFF2-40B4-BE49-F238E27FC236}">
+                  <a16:creationId xmlns:a16="http://schemas.microsoft.com/office/drawing/2014/main" id="{9BC22C2D-9043-9F2D-769E-D5656C458DC8}"/>
+                </a:ext>
+              </a:extLst>
+            </p:cNvPr>
+            <p:cNvSpPr txBox="1"/>
+            <p:nvPr/>
+          </p:nvSpPr>
+          <p:spPr>
+            <a:xfrm>
+              <a:off x="5433231" y="5420540"/>
+              <a:ext cx="6727611" cy="369332"/>
+            </a:xfrm>
+            <a:prstGeom prst="rect">
+              <a:avLst/>
+            </a:prstGeom>
+            <a:noFill/>
+            <a:ln>
+              <a:solidFill>
+                <a:schemeClr val="accent1"/>
+              </a:solidFill>
+            </a:ln>
+          </p:spPr>
+          <p:txBody>
+            <a:bodyPr wrap="none" rtlCol="0">
+              <a:spAutoFit/>
+            </a:bodyPr>
+            <a:lstStyle/>
+            <a:p>
+              <a:r>
+                <a:rPr lang="en-GB" dirty="0" err="1"/>
+                <a:t>MPI_Recv</a:t>
+              </a:r>
+              <a:r>
+                <a:rPr lang="en-GB" dirty="0"/>
+                <a:t>( &amp;</a:t>
+              </a:r>
+              <a:r>
+                <a:rPr lang="en-GB" dirty="0" err="1"/>
+                <a:t>val</a:t>
+              </a:r>
+              <a:r>
+                <a:rPr lang="en-GB" dirty="0"/>
+                <a:t>, 1, Datatype, 0, tag, MPI_COMM_WORLD, &amp;status) </a:t>
+              </a:r>
+            </a:p>
+          </p:txBody>
+        </p:sp>
+      </p:grpSp>
+    </p:spTree>
+    <p:extLst>
+      <p:ext uri="{BB962C8B-B14F-4D97-AF65-F5344CB8AC3E}">
+        <p14:creationId xmlns:p14="http://schemas.microsoft.com/office/powerpoint/2010/main" val="2060761175"/>
+      </p:ext>
+    </p:extLst>
+  </p:cSld>
+  <p:clrMapOvr>
+    <a:masterClrMapping/>
+  </p:clrMapOvr>
+</p:sld>
+</file>
+
 <file path=ppt/theme/theme1.xml><?xml version="1.0" encoding="utf-8"?>
 <a:theme xmlns:a="http://schemas.openxmlformats.org/drawingml/2006/main" name="Office Theme">
   <a:themeElements>
@@ -4254,4 +5514,319 @@
     </a:ext>
   </a:extLst>
 </a:theme>
+</file>
+
+<file path=ppt/theme/theme2.xml><?xml version="1.0" encoding="utf-8"?>
+<a:theme xmlns:a="http://schemas.openxmlformats.org/drawingml/2006/main" name="Office Theme">
+  <a:themeElements>
+    <a:clrScheme name="Office">
+      <a:dk1>
+        <a:sysClr val="windowText" lastClr="000000"/>
+      </a:dk1>
+      <a:lt1>
+        <a:sysClr val="window" lastClr="FFFFFF"/>
+      </a:lt1>
+      <a:dk2>
+        <a:srgbClr val="0E2841"/>
+      </a:dk2>
+      <a:lt2>
+        <a:srgbClr val="E8E8E8"/>
+      </a:lt2>
+      <a:accent1>
+        <a:srgbClr val="156082"/>
+      </a:accent1>
+      <a:accent2>
+        <a:srgbClr val="E97132"/>
+      </a:accent2>
+      <a:accent3>
+        <a:srgbClr val="196B24"/>
+      </a:accent3>
+      <a:accent4>
+        <a:srgbClr val="0F9ED5"/>
+      </a:accent4>
+      <a:accent5>
+        <a:srgbClr val="A02B93"/>
+      </a:accent5>
+      <a:accent6>
+        <a:srgbClr val="4EA72E"/>
+      </a:accent6>
+      <a:hlink>
+        <a:srgbClr val="467886"/>
+      </a:hlink>
+      <a:folHlink>
+        <a:srgbClr val="96607D"/>
+      </a:folHlink>
+    </a:clrScheme>
+    <a:fontScheme name="Office">
+      <a:majorFont>
+        <a:latin typeface="Aptos Display" panose="02110004020202020204"/>
+        <a:ea typeface=""/>
+        <a:cs typeface=""/>
+        <a:font script="Jpan" typeface="游ゴシック Light"/>
+        <a:font script="Hang" typeface="맑은 고딕"/>
+        <a:font script="Hans" typeface="等线 Light"/>
+        <a:font script="Hant" typeface="新細明體"/>
+        <a:font script="Arab" typeface="Times New Roman"/>
+        <a:font script="Hebr" typeface="Times New Roman"/>
+        <a:font script="Thai" typeface="Angsana New"/>
+        <a:font script="Ethi" typeface="Nyala"/>
+        <a:font script="Beng" typeface="Vrinda"/>
+        <a:font script="Gujr" typeface="Shruti"/>
+        <a:font script="Khmr" typeface="MoolBoran"/>
+        <a:font script="Knda" typeface="Tunga"/>
+        <a:font script="Guru" typeface="Raavi"/>
+        <a:font script="Cans" typeface="Euphemia"/>
+        <a:font script="Cher" typeface="Plantagenet Cherokee"/>
+        <a:font script="Yiii" typeface="Microsoft Yi Baiti"/>
+        <a:font script="Tibt" typeface="Microsoft Himalaya"/>
+        <a:font script="Thaa" typeface="MV Boli"/>
+        <a:font script="Deva" typeface="Mangal"/>
+        <a:font script="Telu" typeface="Gautami"/>
+        <a:font script="Taml" typeface="Latha"/>
+        <a:font script="Syrc" typeface="Estrangelo Edessa"/>
+        <a:font script="Orya" typeface="Kalinga"/>
+        <a:font script="Mlym" typeface="Kartika"/>
+        <a:font script="Laoo" typeface="DokChampa"/>
+        <a:font script="Sinh" typeface="Iskoola Pota"/>
+        <a:font script="Mong" typeface="Mongolian Baiti"/>
+        <a:font script="Viet" typeface="Times New Roman"/>
+        <a:font script="Uigh" typeface="Microsoft Uighur"/>
+        <a:font script="Geor" typeface="Sylfaen"/>
+        <a:font script="Armn" typeface="Arial"/>
+        <a:font script="Bugi" typeface="Leelawadee UI"/>
+        <a:font script="Bopo" typeface="Microsoft JhengHei"/>
+        <a:font script="Java" typeface="Javanese Text"/>
+        <a:font script="Lisu" typeface="Segoe UI"/>
+        <a:font script="Mymr" typeface="Myanmar Text"/>
+        <a:font script="Nkoo" typeface="Ebrima"/>
+        <a:font script="Olck" typeface="Nirmala UI"/>
+        <a:font script="Osma" typeface="Ebrima"/>
+        <a:font script="Phag" typeface="Phagspa"/>
+        <a:font script="Syrn" typeface="Estrangelo Edessa"/>
+        <a:font script="Syrj" typeface="Estrangelo Edessa"/>
+        <a:font script="Syre" typeface="Estrangelo Edessa"/>
+        <a:font script="Sora" typeface="Nirmala UI"/>
+        <a:font script="Tale" typeface="Microsoft Tai Le"/>
+        <a:font script="Talu" typeface="Microsoft New Tai Lue"/>
+        <a:font script="Tfng" typeface="Ebrima"/>
+      </a:majorFont>
+      <a:minorFont>
+        <a:latin typeface="Aptos" panose="02110004020202020204"/>
+        <a:ea typeface=""/>
+        <a:cs typeface=""/>
+        <a:font script="Jpan" typeface="游ゴシック"/>
+        <a:font script="Hang" typeface="맑은 고딕"/>
+        <a:font script="Hans" typeface="等线"/>
+        <a:font script="Hant" typeface="新細明體"/>
+        <a:font script="Arab" typeface="Arial"/>
+        <a:font script="Hebr" typeface="Arial"/>
+        <a:font script="Thai" typeface="Cordia New"/>
+        <a:font script="Ethi" typeface="Nyala"/>
+        <a:font script="Beng" typeface="Vrinda"/>
+        <a:font script="Gujr" typeface="Shruti"/>
+        <a:font script="Khmr" typeface="DaunPenh"/>
+        <a:font script="Knda" typeface="Tunga"/>
+        <a:font script="Guru" typeface="Raavi"/>
+        <a:font script="Cans" typeface="Euphemia"/>
+        <a:font script="Cher" typeface="Plantagenet Cherokee"/>
+        <a:font script="Yiii" typeface="Microsoft Yi Baiti"/>
+        <a:font script="Tibt" typeface="Microsoft Himalaya"/>
+        <a:font script="Thaa" typeface="MV Boli"/>
+        <a:font script="Deva" typeface="Mangal"/>
+        <a:font script="Telu" typeface="Gautami"/>
+        <a:font script="Taml" typeface="Latha"/>
+        <a:font script="Syrc" typeface="Estrangelo Edessa"/>
+        <a:font script="Orya" typeface="Kalinga"/>
+        <a:font script="Mlym" typeface="Kartika"/>
+        <a:font script="Laoo" typeface="DokChampa"/>
+        <a:font script="Sinh" typeface="Iskoola Pota"/>
+        <a:font script="Mong" typeface="Mongolian Baiti"/>
+        <a:font script="Viet" typeface="Arial"/>
+        <a:font script="Uigh" typeface="Microsoft Uighur"/>
+        <a:font script="Geor" typeface="Sylfaen"/>
+        <a:font script="Armn" typeface="Arial"/>
+        <a:font script="Bugi" typeface="Leelawadee UI"/>
+        <a:font script="Bopo" typeface="Microsoft JhengHei"/>
+        <a:font script="Java" typeface="Javanese Text"/>
+        <a:font script="Lisu" typeface="Segoe UI"/>
+        <a:font script="Mymr" typeface="Myanmar Text"/>
+        <a:font script="Nkoo" typeface="Ebrima"/>
+        <a:font script="Olck" typeface="Nirmala UI"/>
+        <a:font script="Osma" typeface="Ebrima"/>
+        <a:font script="Phag" typeface="Phagspa"/>
+        <a:font script="Syrn" typeface="Estrangelo Edessa"/>
+        <a:font script="Syrj" typeface="Estrangelo Edessa"/>
+        <a:font script="Syre" typeface="Estrangelo Edessa"/>
+        <a:font script="Sora" typeface="Nirmala UI"/>
+        <a:font script="Tale" typeface="Microsoft Tai Le"/>
+        <a:font script="Talu" typeface="Microsoft New Tai Lue"/>
+        <a:font script="Tfng" typeface="Ebrima"/>
+      </a:minorFont>
+    </a:fontScheme>
+    <a:fmtScheme name="Office">
+      <a:fillStyleLst>
+        <a:solidFill>
+          <a:schemeClr val="phClr"/>
+        </a:solidFill>
+        <a:gradFill rotWithShape="1">
+          <a:gsLst>
+            <a:gs pos="0">
+              <a:schemeClr val="phClr">
+                <a:lumMod val="110000"/>
+                <a:satMod val="105000"/>
+                <a:tint val="67000"/>
+              </a:schemeClr>
+            </a:gs>
+            <a:gs pos="50000">
+              <a:schemeClr val="phClr">
+                <a:lumMod val="105000"/>
+                <a:satMod val="103000"/>
+                <a:tint val="73000"/>
+              </a:schemeClr>
+            </a:gs>
+            <a:gs pos="100000">
+              <a:schemeClr val="phClr">
+                <a:lumMod val="105000"/>
+                <a:satMod val="109000"/>
+                <a:tint val="81000"/>
+              </a:schemeClr>
+            </a:gs>
+          </a:gsLst>
+          <a:lin ang="5400000" scaled="0"/>
+        </a:gradFill>
+        <a:gradFill rotWithShape="1">
+          <a:gsLst>
+            <a:gs pos="0">
+              <a:schemeClr val="phClr">
+                <a:satMod val="103000"/>
+                <a:lumMod val="102000"/>
+                <a:tint val="94000"/>
+              </a:schemeClr>
+            </a:gs>
+            <a:gs pos="50000">
+              <a:schemeClr val="phClr">
+                <a:satMod val="110000"/>
+                <a:lumMod val="100000"/>
+                <a:shade val="100000"/>
+              </a:schemeClr>
+            </a:gs>
+            <a:gs pos="100000">
+              <a:schemeClr val="phClr">
+                <a:lumMod val="99000"/>
+                <a:satMod val="120000"/>
+                <a:shade val="78000"/>
+              </a:schemeClr>
+            </a:gs>
+          </a:gsLst>
+          <a:lin ang="5400000" scaled="0"/>
+        </a:gradFill>
+      </a:fillStyleLst>
+      <a:lnStyleLst>
+        <a:ln w="12700" cap="flat" cmpd="sng" algn="ctr">
+          <a:solidFill>
+            <a:schemeClr val="phClr"/>
+          </a:solidFill>
+          <a:prstDash val="solid"/>
+          <a:miter lim="800000"/>
+        </a:ln>
+        <a:ln w="19050" cap="flat" cmpd="sng" algn="ctr">
+          <a:solidFill>
+            <a:schemeClr val="phClr"/>
+          </a:solidFill>
+          <a:prstDash val="solid"/>
+          <a:miter lim="800000"/>
+        </a:ln>
+        <a:ln w="25400" cap="flat" cmpd="sng" algn="ctr">
+          <a:solidFill>
+            <a:schemeClr val="phClr"/>
+          </a:solidFill>
+          <a:prstDash val="solid"/>
+          <a:miter lim="800000"/>
+        </a:ln>
+      </a:lnStyleLst>
+      <a:effectStyleLst>
+        <a:effectStyle>
+          <a:effectLst/>
+        </a:effectStyle>
+        <a:effectStyle>
+          <a:effectLst/>
+        </a:effectStyle>
+        <a:effectStyle>
+          <a:effectLst>
+            <a:outerShdw blurRad="57150" dist="19050" dir="5400000" algn="ctr" rotWithShape="0">
+              <a:srgbClr val="000000">
+                <a:alpha val="63000"/>
+              </a:srgbClr>
+            </a:outerShdw>
+          </a:effectLst>
+        </a:effectStyle>
+      </a:effectStyleLst>
+      <a:bgFillStyleLst>
+        <a:solidFill>
+          <a:schemeClr val="phClr"/>
+        </a:solidFill>
+        <a:solidFill>
+          <a:schemeClr val="phClr">
+            <a:tint val="95000"/>
+            <a:satMod val="170000"/>
+          </a:schemeClr>
+        </a:solidFill>
+        <a:gradFill rotWithShape="1">
+          <a:gsLst>
+            <a:gs pos="0">
+              <a:schemeClr val="phClr">
+                <a:tint val="93000"/>
+                <a:satMod val="150000"/>
+                <a:shade val="98000"/>
+                <a:lumMod val="102000"/>
+              </a:schemeClr>
+            </a:gs>
+            <a:gs pos="50000">
+              <a:schemeClr val="phClr">
+                <a:tint val="98000"/>
+                <a:satMod val="130000"/>
+                <a:shade val="90000"/>
+                <a:lumMod val="103000"/>
+              </a:schemeClr>
+            </a:gs>
+            <a:gs pos="100000">
+              <a:schemeClr val="phClr">
+                <a:shade val="63000"/>
+                <a:satMod val="120000"/>
+              </a:schemeClr>
+            </a:gs>
+          </a:gsLst>
+          <a:lin ang="5400000" scaled="0"/>
+        </a:gradFill>
+      </a:bgFillStyleLst>
+    </a:fmtScheme>
+  </a:themeElements>
+  <a:objectDefaults>
+    <a:lnDef>
+      <a:spPr/>
+      <a:bodyPr/>
+      <a:lstStyle/>
+      <a:style>
+        <a:lnRef idx="2">
+          <a:schemeClr val="accent1"/>
+        </a:lnRef>
+        <a:fillRef idx="0">
+          <a:schemeClr val="accent1"/>
+        </a:fillRef>
+        <a:effectRef idx="1">
+          <a:schemeClr val="accent1"/>
+        </a:effectRef>
+        <a:fontRef idx="minor">
+          <a:schemeClr val="tx1"/>
+        </a:fontRef>
+      </a:style>
+    </a:lnDef>
+  </a:objectDefaults>
+  <a:extraClrSchemeLst/>
+  <a:extLst>
+    <a:ext uri="{05A4C25C-085E-4340-85A3-A5531E510DB2}">
+      <thm15:themeFamily xmlns:thm15="http://schemas.microsoft.com/office/thememl/2012/main" name="Office Theme" id="{2E142A2C-CD16-42D6-873A-C26D2A0506FA}" vid="{1BDDFF52-6CD6-40A5-AB3C-68EB2F1E4D0A}"/>
+    </a:ext>
+  </a:extLst>
+</a:theme>
 </file>
</xml_diff>

<commit_message>
Message passing around a ring.
</commit_message>
<xml_diff>
--- a/imgs/images.pptx
+++ b/imgs/images.pptx
@@ -5,12 +5,13 @@
     <p:sldMasterId id="2147483648" r:id="rId1"/>
   </p:sldMasterIdLst>
   <p:notesMasterIdLst>
-    <p:notesMasterId r:id="rId5"/>
+    <p:notesMasterId r:id="rId6"/>
   </p:notesMasterIdLst>
   <p:sldIdLst>
     <p:sldId id="256" r:id="rId2"/>
     <p:sldId id="257" r:id="rId3"/>
     <p:sldId id="258" r:id="rId4"/>
+    <p:sldId id="259" r:id="rId5"/>
   </p:sldIdLst>
   <p:sldSz cx="12192000" cy="6858000"/>
   <p:notesSz cx="6858000" cy="9144000"/>
@@ -199,7 +200,7 @@
           <a:p>
             <a:fld id="{3A552440-A9F1-9B40-BE29-1D667B302F42}" type="datetimeFigureOut">
               <a:rPr lang="en-GB" smtClean="0"/>
-              <a:t>30/07/2025</a:t>
+              <a:t>31/07/2025</a:t>
             </a:fld>
             <a:endParaRPr lang="en-GB"/>
           </a:p>
@@ -550,6 +551,90 @@
 </p:notes>
 </file>
 
+<file path=ppt/notesSlides/notesSlide2.xml><?xml version="1.0" encoding="utf-8"?>
+<p:notes xmlns:a="http://schemas.openxmlformats.org/drawingml/2006/main" xmlns:r="http://schemas.openxmlformats.org/officeDocument/2006/relationships" xmlns:p="http://schemas.openxmlformats.org/presentationml/2006/main">
+  <p:cSld>
+    <p:spTree>
+      <p:nvGrpSpPr>
+        <p:cNvPr id="1" name=""/>
+        <p:cNvGrpSpPr/>
+        <p:nvPr/>
+      </p:nvGrpSpPr>
+      <p:grpSpPr>
+        <a:xfrm>
+          <a:off x="0" y="0"/>
+          <a:ext cx="0" cy="0"/>
+          <a:chOff x="0" y="0"/>
+          <a:chExt cx="0" cy="0"/>
+        </a:xfrm>
+      </p:grpSpPr>
+      <p:sp>
+        <p:nvSpPr>
+          <p:cNvPr id="2" name="Slide Image Placeholder 1"/>
+          <p:cNvSpPr>
+            <a:spLocks noGrp="1" noRot="1" noChangeAspect="1"/>
+          </p:cNvSpPr>
+          <p:nvPr>
+            <p:ph type="sldImg"/>
+          </p:nvPr>
+        </p:nvSpPr>
+        <p:spPr/>
+      </p:sp>
+      <p:sp>
+        <p:nvSpPr>
+          <p:cNvPr id="3" name="Notes Placeholder 2"/>
+          <p:cNvSpPr>
+            <a:spLocks noGrp="1"/>
+          </p:cNvSpPr>
+          <p:nvPr>
+            <p:ph type="body" idx="1"/>
+          </p:nvPr>
+        </p:nvSpPr>
+        <p:spPr/>
+        <p:txBody>
+          <a:bodyPr/>
+          <a:lstStyle/>
+          <a:p>
+            <a:endParaRPr lang="en-GB" dirty="0"/>
+          </a:p>
+        </p:txBody>
+      </p:sp>
+      <p:sp>
+        <p:nvSpPr>
+          <p:cNvPr id="4" name="Slide Number Placeholder 3"/>
+          <p:cNvSpPr>
+            <a:spLocks noGrp="1"/>
+          </p:cNvSpPr>
+          <p:nvPr>
+            <p:ph type="sldNum" sz="quarter" idx="5"/>
+          </p:nvPr>
+        </p:nvSpPr>
+        <p:spPr/>
+        <p:txBody>
+          <a:bodyPr/>
+          <a:lstStyle/>
+          <a:p>
+            <a:fld id="{390BCC12-00AC-4D4C-881A-83AE6B26A1A4}" type="slidenum">
+              <a:rPr lang="en-GB" smtClean="0"/>
+              <a:t>4</a:t>
+            </a:fld>
+            <a:endParaRPr lang="en-GB"/>
+          </a:p>
+        </p:txBody>
+      </p:sp>
+    </p:spTree>
+    <p:extLst>
+      <p:ext uri="{BB962C8B-B14F-4D97-AF65-F5344CB8AC3E}">
+        <p14:creationId xmlns:p14="http://schemas.microsoft.com/office/powerpoint/2010/main" val="1351347557"/>
+      </p:ext>
+    </p:extLst>
+  </p:cSld>
+  <p:clrMapOvr>
+    <a:masterClrMapping/>
+  </p:clrMapOvr>
+</p:notes>
+</file>
+
 <file path=ppt/slideLayouts/slideLayout1.xml><?xml version="1.0" encoding="utf-8"?>
 <p:sldLayout xmlns:a="http://schemas.openxmlformats.org/drawingml/2006/main" xmlns:r="http://schemas.openxmlformats.org/officeDocument/2006/relationships" xmlns:p="http://schemas.openxmlformats.org/presentationml/2006/main" type="title" preserve="1">
   <p:cSld name="Title Slide">
@@ -697,7 +782,7 @@
           <a:p>
             <a:fld id="{114D721D-651F-D74D-B0A0-3A9FA6A2534E}" type="datetimeFigureOut">
               <a:rPr lang="en-GB" smtClean="0"/>
-              <a:t>29/07/2025</a:t>
+              <a:t>31/07/2025</a:t>
             </a:fld>
             <a:endParaRPr lang="en-GB"/>
           </a:p>
@@ -895,7 +980,7 @@
           <a:p>
             <a:fld id="{114D721D-651F-D74D-B0A0-3A9FA6A2534E}" type="datetimeFigureOut">
               <a:rPr lang="en-GB" smtClean="0"/>
-              <a:t>29/07/2025</a:t>
+              <a:t>31/07/2025</a:t>
             </a:fld>
             <a:endParaRPr lang="en-GB"/>
           </a:p>
@@ -1103,7 +1188,7 @@
           <a:p>
             <a:fld id="{114D721D-651F-D74D-B0A0-3A9FA6A2534E}" type="datetimeFigureOut">
               <a:rPr lang="en-GB" smtClean="0"/>
-              <a:t>29/07/2025</a:t>
+              <a:t>31/07/2025</a:t>
             </a:fld>
             <a:endParaRPr lang="en-GB"/>
           </a:p>
@@ -1301,7 +1386,7 @@
           <a:p>
             <a:fld id="{114D721D-651F-D74D-B0A0-3A9FA6A2534E}" type="datetimeFigureOut">
               <a:rPr lang="en-GB" smtClean="0"/>
-              <a:t>29/07/2025</a:t>
+              <a:t>31/07/2025</a:t>
             </a:fld>
             <a:endParaRPr lang="en-GB"/>
           </a:p>
@@ -1576,7 +1661,7 @@
           <a:p>
             <a:fld id="{114D721D-651F-D74D-B0A0-3A9FA6A2534E}" type="datetimeFigureOut">
               <a:rPr lang="en-GB" smtClean="0"/>
-              <a:t>29/07/2025</a:t>
+              <a:t>31/07/2025</a:t>
             </a:fld>
             <a:endParaRPr lang="en-GB"/>
           </a:p>
@@ -1841,7 +1926,7 @@
           <a:p>
             <a:fld id="{114D721D-651F-D74D-B0A0-3A9FA6A2534E}" type="datetimeFigureOut">
               <a:rPr lang="en-GB" smtClean="0"/>
-              <a:t>29/07/2025</a:t>
+              <a:t>31/07/2025</a:t>
             </a:fld>
             <a:endParaRPr lang="en-GB"/>
           </a:p>
@@ -2253,7 +2338,7 @@
           <a:p>
             <a:fld id="{114D721D-651F-D74D-B0A0-3A9FA6A2534E}" type="datetimeFigureOut">
               <a:rPr lang="en-GB" smtClean="0"/>
-              <a:t>29/07/2025</a:t>
+              <a:t>31/07/2025</a:t>
             </a:fld>
             <a:endParaRPr lang="en-GB"/>
           </a:p>
@@ -2394,7 +2479,7 @@
           <a:p>
             <a:fld id="{114D721D-651F-D74D-B0A0-3A9FA6A2534E}" type="datetimeFigureOut">
               <a:rPr lang="en-GB" smtClean="0"/>
-              <a:t>29/07/2025</a:t>
+              <a:t>31/07/2025</a:t>
             </a:fld>
             <a:endParaRPr lang="en-GB"/>
           </a:p>
@@ -2507,7 +2592,7 @@
           <a:p>
             <a:fld id="{114D721D-651F-D74D-B0A0-3A9FA6A2534E}" type="datetimeFigureOut">
               <a:rPr lang="en-GB" smtClean="0"/>
-              <a:t>29/07/2025</a:t>
+              <a:t>31/07/2025</a:t>
             </a:fld>
             <a:endParaRPr lang="en-GB"/>
           </a:p>
@@ -2818,7 +2903,7 @@
           <a:p>
             <a:fld id="{114D721D-651F-D74D-B0A0-3A9FA6A2534E}" type="datetimeFigureOut">
               <a:rPr lang="en-GB" smtClean="0"/>
-              <a:t>29/07/2025</a:t>
+              <a:t>31/07/2025</a:t>
             </a:fld>
             <a:endParaRPr lang="en-GB"/>
           </a:p>
@@ -3106,7 +3191,7 @@
           <a:p>
             <a:fld id="{114D721D-651F-D74D-B0A0-3A9FA6A2534E}" type="datetimeFigureOut">
               <a:rPr lang="en-GB" smtClean="0"/>
-              <a:t>29/07/2025</a:t>
+              <a:t>31/07/2025</a:t>
             </a:fld>
             <a:endParaRPr lang="en-GB"/>
           </a:p>
@@ -3347,7 +3432,7 @@
           <a:p>
             <a:fld id="{114D721D-651F-D74D-B0A0-3A9FA6A2534E}" type="datetimeFigureOut">
               <a:rPr lang="en-GB" smtClean="0"/>
-              <a:t>29/07/2025</a:t>
+              <a:t>31/07/2025</a:t>
             </a:fld>
             <a:endParaRPr lang="en-GB"/>
           </a:p>
@@ -4409,7 +4494,7 @@
         </p:nvGrpSpPr>
         <p:grpSpPr>
           <a:xfrm>
-            <a:off x="1405350" y="1711144"/>
+            <a:off x="841824" y="1711144"/>
             <a:ext cx="10755492" cy="4078728"/>
             <a:chOff x="1405350" y="1711144"/>
             <a:chExt cx="10755492" cy="4078728"/>
@@ -5201,6 +5286,1064 @@
 </p:sld>
 </file>
 
+<file path=ppt/slides/slide4.xml><?xml version="1.0" encoding="utf-8"?>
+<p:sld xmlns:a="http://schemas.openxmlformats.org/drawingml/2006/main" xmlns:r="http://schemas.openxmlformats.org/officeDocument/2006/relationships" xmlns:p="http://schemas.openxmlformats.org/presentationml/2006/main">
+  <p:cSld>
+    <p:spTree>
+      <p:nvGrpSpPr>
+        <p:cNvPr id="1" name="">
+          <a:extLst>
+            <a:ext uri="{FF2B5EF4-FFF2-40B4-BE49-F238E27FC236}">
+              <a16:creationId xmlns:a16="http://schemas.microsoft.com/office/drawing/2014/main" id="{F39E4D19-ED2D-9B47-EFD7-6C1149F2F620}"/>
+            </a:ext>
+          </a:extLst>
+        </p:cNvPr>
+        <p:cNvGrpSpPr/>
+        <p:nvPr/>
+      </p:nvGrpSpPr>
+      <p:grpSpPr>
+        <a:xfrm>
+          <a:off x="0" y="0"/>
+          <a:ext cx="0" cy="0"/>
+          <a:chOff x="0" y="0"/>
+          <a:chExt cx="0" cy="0"/>
+        </a:xfrm>
+      </p:grpSpPr>
+      <p:grpSp>
+        <p:nvGrpSpPr>
+          <p:cNvPr id="21" name="Group 20">
+            <a:extLst>
+              <a:ext uri="{FF2B5EF4-FFF2-40B4-BE49-F238E27FC236}">
+                <a16:creationId xmlns:a16="http://schemas.microsoft.com/office/drawing/2014/main" id="{1A9E025B-117D-5BA2-7A72-D1C99B54B026}"/>
+              </a:ext>
+            </a:extLst>
+          </p:cNvPr>
+          <p:cNvGrpSpPr/>
+          <p:nvPr/>
+        </p:nvGrpSpPr>
+        <p:grpSpPr>
+          <a:xfrm>
+            <a:off x="4149036" y="1331195"/>
+            <a:ext cx="4398393" cy="3840644"/>
+            <a:chOff x="4359348" y="2062715"/>
+            <a:chExt cx="4398393" cy="3840644"/>
+          </a:xfrm>
+        </p:grpSpPr>
+        <p:sp>
+          <p:nvSpPr>
+            <p:cNvPr id="3" name="Rectangle 2">
+              <a:extLst>
+                <a:ext uri="{FF2B5EF4-FFF2-40B4-BE49-F238E27FC236}">
+                  <a16:creationId xmlns:a16="http://schemas.microsoft.com/office/drawing/2014/main" id="{D6A41EE2-2FA7-9A6C-47A5-FDF6F8F75013}"/>
+                </a:ext>
+              </a:extLst>
+            </p:cNvPr>
+            <p:cNvSpPr/>
+            <p:nvPr/>
+          </p:nvSpPr>
+          <p:spPr>
+            <a:xfrm>
+              <a:off x="4359348" y="2062715"/>
+              <a:ext cx="4295554" cy="3437861"/>
+            </a:xfrm>
+            <a:prstGeom prst="rect">
+              <a:avLst/>
+            </a:prstGeom>
+          </p:spPr>
+          <p:style>
+            <a:lnRef idx="2">
+              <a:schemeClr val="accent1">
+                <a:shade val="15000"/>
+              </a:schemeClr>
+            </a:lnRef>
+            <a:fillRef idx="1">
+              <a:schemeClr val="accent1"/>
+            </a:fillRef>
+            <a:effectRef idx="0">
+              <a:schemeClr val="accent1"/>
+            </a:effectRef>
+            <a:fontRef idx="minor">
+              <a:schemeClr val="lt1"/>
+            </a:fontRef>
+          </p:style>
+          <p:txBody>
+            <a:bodyPr rtlCol="0" anchor="ctr"/>
+            <a:lstStyle/>
+            <a:p>
+              <a:pPr algn="ctr"/>
+              <a:endParaRPr lang="en-GB"/>
+            </a:p>
+          </p:txBody>
+        </p:sp>
+        <p:sp>
+          <p:nvSpPr>
+            <p:cNvPr id="4" name="Oval 3">
+              <a:extLst>
+                <a:ext uri="{FF2B5EF4-FFF2-40B4-BE49-F238E27FC236}">
+                  <a16:creationId xmlns:a16="http://schemas.microsoft.com/office/drawing/2014/main" id="{44935F6F-BD25-089D-A0AA-D39F03480D7C}"/>
+                </a:ext>
+              </a:extLst>
+            </p:cNvPr>
+            <p:cNvSpPr/>
+            <p:nvPr/>
+          </p:nvSpPr>
+          <p:spPr>
+            <a:xfrm>
+              <a:off x="5298129" y="2728622"/>
+              <a:ext cx="503274" cy="439479"/>
+            </a:xfrm>
+            <a:prstGeom prst="ellipse">
+              <a:avLst/>
+            </a:prstGeom>
+            <a:solidFill>
+              <a:srgbClr val="FF0000"/>
+            </a:solidFill>
+            <a:effectLst>
+              <a:outerShdw blurRad="50800" dist="38100" dir="18900000" algn="bl" rotWithShape="0">
+                <a:prstClr val="black">
+                  <a:alpha val="40000"/>
+                </a:prstClr>
+              </a:outerShdw>
+            </a:effectLst>
+          </p:spPr>
+          <p:style>
+            <a:lnRef idx="2">
+              <a:schemeClr val="accent1">
+                <a:shade val="15000"/>
+              </a:schemeClr>
+            </a:lnRef>
+            <a:fillRef idx="1">
+              <a:schemeClr val="accent1"/>
+            </a:fillRef>
+            <a:effectRef idx="0">
+              <a:schemeClr val="accent1"/>
+            </a:effectRef>
+            <a:fontRef idx="minor">
+              <a:schemeClr val="lt1"/>
+            </a:fontRef>
+          </p:style>
+          <p:txBody>
+            <a:bodyPr rtlCol="0" anchor="ctr"/>
+            <a:lstStyle/>
+            <a:p>
+              <a:pPr algn="ctr"/>
+              <a:r>
+                <a:rPr lang="en-GB" dirty="0"/>
+                <a:t>0</a:t>
+              </a:r>
+            </a:p>
+          </p:txBody>
+        </p:sp>
+        <p:sp>
+          <p:nvSpPr>
+            <p:cNvPr id="5" name="Oval 4">
+              <a:extLst>
+                <a:ext uri="{FF2B5EF4-FFF2-40B4-BE49-F238E27FC236}">
+                  <a16:creationId xmlns:a16="http://schemas.microsoft.com/office/drawing/2014/main" id="{D2AECAC0-FF68-97AF-917C-8B1E28C41443}"/>
+                </a:ext>
+              </a:extLst>
+            </p:cNvPr>
+            <p:cNvSpPr/>
+            <p:nvPr/>
+          </p:nvSpPr>
+          <p:spPr>
+            <a:xfrm>
+              <a:off x="7403479" y="2866694"/>
+              <a:ext cx="503274" cy="439479"/>
+            </a:xfrm>
+            <a:prstGeom prst="ellipse">
+              <a:avLst/>
+            </a:prstGeom>
+            <a:solidFill>
+              <a:srgbClr val="FF0000"/>
+            </a:solidFill>
+            <a:effectLst>
+              <a:outerShdw blurRad="50800" dist="38100" dir="18900000" algn="bl" rotWithShape="0">
+                <a:prstClr val="black">
+                  <a:alpha val="40000"/>
+                </a:prstClr>
+              </a:outerShdw>
+            </a:effectLst>
+          </p:spPr>
+          <p:style>
+            <a:lnRef idx="2">
+              <a:schemeClr val="accent1">
+                <a:shade val="15000"/>
+              </a:schemeClr>
+            </a:lnRef>
+            <a:fillRef idx="1">
+              <a:schemeClr val="accent1"/>
+            </a:fillRef>
+            <a:effectRef idx="0">
+              <a:schemeClr val="accent1"/>
+            </a:effectRef>
+            <a:fontRef idx="minor">
+              <a:schemeClr val="lt1"/>
+            </a:fontRef>
+          </p:style>
+          <p:txBody>
+            <a:bodyPr rtlCol="0" anchor="ctr"/>
+            <a:lstStyle/>
+            <a:p>
+              <a:pPr algn="ctr"/>
+              <a:r>
+                <a:rPr lang="en-GB" dirty="0"/>
+                <a:t>2</a:t>
+              </a:r>
+            </a:p>
+          </p:txBody>
+        </p:sp>
+        <p:sp>
+          <p:nvSpPr>
+            <p:cNvPr id="6" name="Oval 5">
+              <a:extLst>
+                <a:ext uri="{FF2B5EF4-FFF2-40B4-BE49-F238E27FC236}">
+                  <a16:creationId xmlns:a16="http://schemas.microsoft.com/office/drawing/2014/main" id="{82F47417-F277-7F0F-F25E-7761F58CA210}"/>
+                </a:ext>
+              </a:extLst>
+            </p:cNvPr>
+            <p:cNvSpPr/>
+            <p:nvPr/>
+          </p:nvSpPr>
+          <p:spPr>
+            <a:xfrm>
+              <a:off x="7906753" y="3965412"/>
+              <a:ext cx="503274" cy="439479"/>
+            </a:xfrm>
+            <a:prstGeom prst="ellipse">
+              <a:avLst/>
+            </a:prstGeom>
+            <a:solidFill>
+              <a:srgbClr val="FF0000"/>
+            </a:solidFill>
+            <a:effectLst>
+              <a:outerShdw blurRad="50800" dist="38100" dir="18900000" algn="bl" rotWithShape="0">
+                <a:prstClr val="black">
+                  <a:alpha val="40000"/>
+                </a:prstClr>
+              </a:outerShdw>
+            </a:effectLst>
+          </p:spPr>
+          <p:style>
+            <a:lnRef idx="2">
+              <a:schemeClr val="accent1">
+                <a:shade val="15000"/>
+              </a:schemeClr>
+            </a:lnRef>
+            <a:fillRef idx="1">
+              <a:schemeClr val="accent1"/>
+            </a:fillRef>
+            <a:effectRef idx="0">
+              <a:schemeClr val="accent1"/>
+            </a:effectRef>
+            <a:fontRef idx="minor">
+              <a:schemeClr val="lt1"/>
+            </a:fontRef>
+          </p:style>
+          <p:txBody>
+            <a:bodyPr rtlCol="0" anchor="ctr"/>
+            <a:lstStyle/>
+            <a:p>
+              <a:pPr algn="ctr"/>
+              <a:r>
+                <a:rPr lang="en-GB" dirty="0"/>
+                <a:t>3</a:t>
+              </a:r>
+            </a:p>
+          </p:txBody>
+        </p:sp>
+        <p:sp>
+          <p:nvSpPr>
+            <p:cNvPr id="7" name="Oval 6">
+              <a:extLst>
+                <a:ext uri="{FF2B5EF4-FFF2-40B4-BE49-F238E27FC236}">
+                  <a16:creationId xmlns:a16="http://schemas.microsoft.com/office/drawing/2014/main" id="{BD09C513-7B04-96EB-ABC7-A51C7D40830E}"/>
+                </a:ext>
+              </a:extLst>
+            </p:cNvPr>
+            <p:cNvSpPr/>
+            <p:nvPr/>
+          </p:nvSpPr>
+          <p:spPr>
+            <a:xfrm>
+              <a:off x="7163522" y="4906153"/>
+              <a:ext cx="503274" cy="439479"/>
+            </a:xfrm>
+            <a:prstGeom prst="ellipse">
+              <a:avLst/>
+            </a:prstGeom>
+            <a:solidFill>
+              <a:srgbClr val="FF0000"/>
+            </a:solidFill>
+            <a:effectLst>
+              <a:outerShdw blurRad="50800" dist="38100" dir="18900000" algn="bl" rotWithShape="0">
+                <a:prstClr val="black">
+                  <a:alpha val="40000"/>
+                </a:prstClr>
+              </a:outerShdw>
+            </a:effectLst>
+          </p:spPr>
+          <p:style>
+            <a:lnRef idx="2">
+              <a:schemeClr val="accent1">
+                <a:shade val="15000"/>
+              </a:schemeClr>
+            </a:lnRef>
+            <a:fillRef idx="1">
+              <a:schemeClr val="accent1"/>
+            </a:fillRef>
+            <a:effectRef idx="0">
+              <a:schemeClr val="accent1"/>
+            </a:effectRef>
+            <a:fontRef idx="minor">
+              <a:schemeClr val="lt1"/>
+            </a:fontRef>
+          </p:style>
+          <p:txBody>
+            <a:bodyPr rtlCol="0" anchor="ctr"/>
+            <a:lstStyle/>
+            <a:p>
+              <a:pPr algn="ctr"/>
+              <a:r>
+                <a:rPr lang="en-GB" dirty="0"/>
+                <a:t>4</a:t>
+              </a:r>
+            </a:p>
+          </p:txBody>
+        </p:sp>
+        <p:sp>
+          <p:nvSpPr>
+            <p:cNvPr id="8" name="Oval 7">
+              <a:extLst>
+                <a:ext uri="{FF2B5EF4-FFF2-40B4-BE49-F238E27FC236}">
+                  <a16:creationId xmlns:a16="http://schemas.microsoft.com/office/drawing/2014/main" id="{F5DB4E45-16DA-A04D-7FD8-DED5DCE13460}"/>
+                </a:ext>
+              </a:extLst>
+            </p:cNvPr>
+            <p:cNvSpPr/>
+            <p:nvPr/>
+          </p:nvSpPr>
+          <p:spPr>
+            <a:xfrm>
+              <a:off x="5935833" y="4883196"/>
+              <a:ext cx="503274" cy="439479"/>
+            </a:xfrm>
+            <a:prstGeom prst="ellipse">
+              <a:avLst/>
+            </a:prstGeom>
+            <a:solidFill>
+              <a:srgbClr val="FF0000"/>
+            </a:solidFill>
+            <a:effectLst>
+              <a:outerShdw blurRad="50800" dist="38100" dir="18900000" algn="bl" rotWithShape="0">
+                <a:prstClr val="black">
+                  <a:alpha val="40000"/>
+                </a:prstClr>
+              </a:outerShdw>
+            </a:effectLst>
+          </p:spPr>
+          <p:style>
+            <a:lnRef idx="2">
+              <a:schemeClr val="accent1">
+                <a:shade val="15000"/>
+              </a:schemeClr>
+            </a:lnRef>
+            <a:fillRef idx="1">
+              <a:schemeClr val="accent1"/>
+            </a:fillRef>
+            <a:effectRef idx="0">
+              <a:schemeClr val="accent1"/>
+            </a:effectRef>
+            <a:fontRef idx="minor">
+              <a:schemeClr val="lt1"/>
+            </a:fontRef>
+          </p:style>
+          <p:txBody>
+            <a:bodyPr rtlCol="0" anchor="ctr"/>
+            <a:lstStyle/>
+            <a:p>
+              <a:pPr algn="ctr"/>
+              <a:r>
+                <a:rPr lang="en-GB" dirty="0"/>
+                <a:t>5</a:t>
+              </a:r>
+            </a:p>
+          </p:txBody>
+        </p:sp>
+        <p:sp>
+          <p:nvSpPr>
+            <p:cNvPr id="9" name="Oval 8">
+              <a:extLst>
+                <a:ext uri="{FF2B5EF4-FFF2-40B4-BE49-F238E27FC236}">
+                  <a16:creationId xmlns:a16="http://schemas.microsoft.com/office/drawing/2014/main" id="{1ADF83E3-A042-2694-A55B-EBF518D4B90B}"/>
+                </a:ext>
+              </a:extLst>
+            </p:cNvPr>
+            <p:cNvSpPr/>
+            <p:nvPr/>
+          </p:nvSpPr>
+          <p:spPr>
+            <a:xfrm>
+              <a:off x="6414697" y="2289143"/>
+              <a:ext cx="503274" cy="439479"/>
+            </a:xfrm>
+            <a:prstGeom prst="ellipse">
+              <a:avLst/>
+            </a:prstGeom>
+            <a:solidFill>
+              <a:srgbClr val="FF0000"/>
+            </a:solidFill>
+            <a:effectLst>
+              <a:outerShdw blurRad="50800" dist="38100" dir="18900000" algn="bl" rotWithShape="0">
+                <a:prstClr val="black">
+                  <a:alpha val="40000"/>
+                </a:prstClr>
+              </a:outerShdw>
+            </a:effectLst>
+          </p:spPr>
+          <p:style>
+            <a:lnRef idx="2">
+              <a:schemeClr val="accent1">
+                <a:shade val="15000"/>
+              </a:schemeClr>
+            </a:lnRef>
+            <a:fillRef idx="1">
+              <a:schemeClr val="accent1"/>
+            </a:fillRef>
+            <a:effectRef idx="0">
+              <a:schemeClr val="accent1"/>
+            </a:effectRef>
+            <a:fontRef idx="minor">
+              <a:schemeClr val="lt1"/>
+            </a:fontRef>
+          </p:style>
+          <p:txBody>
+            <a:bodyPr rtlCol="0" anchor="ctr"/>
+            <a:lstStyle/>
+            <a:p>
+              <a:pPr algn="ctr"/>
+              <a:r>
+                <a:rPr lang="en-GB" dirty="0"/>
+                <a:t>1</a:t>
+              </a:r>
+            </a:p>
+          </p:txBody>
+        </p:sp>
+        <p:sp>
+          <p:nvSpPr>
+            <p:cNvPr id="10" name="Oval 9">
+              <a:extLst>
+                <a:ext uri="{FF2B5EF4-FFF2-40B4-BE49-F238E27FC236}">
+                  <a16:creationId xmlns:a16="http://schemas.microsoft.com/office/drawing/2014/main" id="{C4F3A6AE-05A6-4A47-5AB1-4C94A1F70E2D}"/>
+                </a:ext>
+              </a:extLst>
+            </p:cNvPr>
+            <p:cNvSpPr/>
+            <p:nvPr/>
+          </p:nvSpPr>
+          <p:spPr>
+            <a:xfrm>
+              <a:off x="4830419" y="4631101"/>
+              <a:ext cx="503274" cy="519050"/>
+            </a:xfrm>
+            <a:prstGeom prst="ellipse">
+              <a:avLst/>
+            </a:prstGeom>
+            <a:solidFill>
+              <a:srgbClr val="FF0000"/>
+            </a:solidFill>
+            <a:effectLst>
+              <a:outerShdw blurRad="50800" dist="38100" dir="18900000" algn="bl" rotWithShape="0">
+                <a:prstClr val="black">
+                  <a:alpha val="40000"/>
+                </a:prstClr>
+              </a:outerShdw>
+            </a:effectLst>
+          </p:spPr>
+          <p:style>
+            <a:lnRef idx="2">
+              <a:schemeClr val="accent1">
+                <a:shade val="15000"/>
+              </a:schemeClr>
+            </a:lnRef>
+            <a:fillRef idx="1">
+              <a:schemeClr val="accent1"/>
+            </a:fillRef>
+            <a:effectRef idx="0">
+              <a:schemeClr val="accent1"/>
+            </a:effectRef>
+            <a:fontRef idx="minor">
+              <a:schemeClr val="lt1"/>
+            </a:fontRef>
+          </p:style>
+          <p:txBody>
+            <a:bodyPr rtlCol="0" anchor="ctr"/>
+            <a:lstStyle/>
+            <a:p>
+              <a:pPr algn="ctr"/>
+              <a:r>
+                <a:rPr lang="en-GB" dirty="0"/>
+                <a:t>6</a:t>
+              </a:r>
+            </a:p>
+          </p:txBody>
+        </p:sp>
+        <p:sp>
+          <p:nvSpPr>
+            <p:cNvPr id="11" name="Oval 10">
+              <a:extLst>
+                <a:ext uri="{FF2B5EF4-FFF2-40B4-BE49-F238E27FC236}">
+                  <a16:creationId xmlns:a16="http://schemas.microsoft.com/office/drawing/2014/main" id="{32734A9A-8776-6B74-DBE4-5C52317797A8}"/>
+                </a:ext>
+              </a:extLst>
+            </p:cNvPr>
+            <p:cNvSpPr/>
+            <p:nvPr/>
+          </p:nvSpPr>
+          <p:spPr>
+            <a:xfrm>
+              <a:off x="4603887" y="3634191"/>
+              <a:ext cx="503274" cy="439479"/>
+            </a:xfrm>
+            <a:prstGeom prst="ellipse">
+              <a:avLst/>
+            </a:prstGeom>
+            <a:solidFill>
+              <a:srgbClr val="FF0000"/>
+            </a:solidFill>
+            <a:effectLst>
+              <a:outerShdw blurRad="50800" dist="38100" dir="18900000" algn="bl" rotWithShape="0">
+                <a:prstClr val="black">
+                  <a:alpha val="40000"/>
+                </a:prstClr>
+              </a:outerShdw>
+            </a:effectLst>
+          </p:spPr>
+          <p:style>
+            <a:lnRef idx="2">
+              <a:schemeClr val="accent1">
+                <a:shade val="15000"/>
+              </a:schemeClr>
+            </a:lnRef>
+            <a:fillRef idx="1">
+              <a:schemeClr val="accent1"/>
+            </a:fillRef>
+            <a:effectRef idx="0">
+              <a:schemeClr val="accent1"/>
+            </a:effectRef>
+            <a:fontRef idx="minor">
+              <a:schemeClr val="lt1"/>
+            </a:fontRef>
+          </p:style>
+          <p:txBody>
+            <a:bodyPr rtlCol="0" anchor="ctr"/>
+            <a:lstStyle/>
+            <a:p>
+              <a:pPr algn="ctr"/>
+              <a:r>
+                <a:rPr lang="en-GB" dirty="0"/>
+                <a:t>7</a:t>
+              </a:r>
+            </a:p>
+          </p:txBody>
+        </p:sp>
+        <p:sp>
+          <p:nvSpPr>
+            <p:cNvPr id="12" name="TextBox 11">
+              <a:extLst>
+                <a:ext uri="{FF2B5EF4-FFF2-40B4-BE49-F238E27FC236}">
+                  <a16:creationId xmlns:a16="http://schemas.microsoft.com/office/drawing/2014/main" id="{68A223AC-571E-5823-763C-6FAD378A35E0}"/>
+                </a:ext>
+              </a:extLst>
+            </p:cNvPr>
+            <p:cNvSpPr txBox="1"/>
+            <p:nvPr/>
+          </p:nvSpPr>
+          <p:spPr>
+            <a:xfrm>
+              <a:off x="6507125" y="5534027"/>
+              <a:ext cx="2250616" cy="369332"/>
+            </a:xfrm>
+            <a:prstGeom prst="rect">
+              <a:avLst/>
+            </a:prstGeom>
+            <a:noFill/>
+          </p:spPr>
+          <p:txBody>
+            <a:bodyPr wrap="none" rtlCol="0">
+              <a:spAutoFit/>
+            </a:bodyPr>
+            <a:lstStyle/>
+            <a:p>
+              <a:r>
+                <a:rPr lang="en-GB" dirty="0"/>
+                <a:t>MPI_COMM_WORLD</a:t>
+              </a:r>
+            </a:p>
+          </p:txBody>
+        </p:sp>
+        <p:sp>
+          <p:nvSpPr>
+            <p:cNvPr id="2" name="Up Arrow 1">
+              <a:extLst>
+                <a:ext uri="{FF2B5EF4-FFF2-40B4-BE49-F238E27FC236}">
+                  <a16:creationId xmlns:a16="http://schemas.microsoft.com/office/drawing/2014/main" id="{DE40B1CF-AE85-3028-267B-B8A7E56BAC45}"/>
+                </a:ext>
+              </a:extLst>
+            </p:cNvPr>
+            <p:cNvSpPr/>
+            <p:nvPr/>
+          </p:nvSpPr>
+          <p:spPr>
+            <a:xfrm rot="3954556">
+              <a:off x="5954908" y="2394315"/>
+              <a:ext cx="306284" cy="588337"/>
+            </a:xfrm>
+            <a:prstGeom prst="upArrow">
+              <a:avLst/>
+            </a:prstGeom>
+            <a:solidFill>
+              <a:srgbClr val="FF0000"/>
+            </a:solidFill>
+            <a:effectLst>
+              <a:outerShdw blurRad="50800" dist="38100" dir="18900000" algn="bl" rotWithShape="0">
+                <a:prstClr val="black">
+                  <a:alpha val="40000"/>
+                </a:prstClr>
+              </a:outerShdw>
+            </a:effectLst>
+          </p:spPr>
+          <p:style>
+            <a:lnRef idx="2">
+              <a:schemeClr val="accent1">
+                <a:shade val="15000"/>
+              </a:schemeClr>
+            </a:lnRef>
+            <a:fillRef idx="1">
+              <a:schemeClr val="accent1"/>
+            </a:fillRef>
+            <a:effectRef idx="0">
+              <a:schemeClr val="accent1"/>
+            </a:effectRef>
+            <a:fontRef idx="minor">
+              <a:schemeClr val="lt1"/>
+            </a:fontRef>
+          </p:style>
+          <p:txBody>
+            <a:bodyPr rtlCol="0" anchor="ctr"/>
+            <a:lstStyle/>
+            <a:p>
+              <a:pPr algn="ctr"/>
+              <a:endParaRPr lang="en-GB" dirty="0"/>
+            </a:p>
+          </p:txBody>
+        </p:sp>
+        <p:sp>
+          <p:nvSpPr>
+            <p:cNvPr id="14" name="Up Arrow 13">
+              <a:extLst>
+                <a:ext uri="{FF2B5EF4-FFF2-40B4-BE49-F238E27FC236}">
+                  <a16:creationId xmlns:a16="http://schemas.microsoft.com/office/drawing/2014/main" id="{D6F3800F-DF87-4617-32A6-DFAE33D0186F}"/>
+                </a:ext>
+              </a:extLst>
+            </p:cNvPr>
+            <p:cNvSpPr/>
+            <p:nvPr/>
+          </p:nvSpPr>
+          <p:spPr>
+            <a:xfrm rot="7315411">
+              <a:off x="7001993" y="2506733"/>
+              <a:ext cx="306284" cy="588337"/>
+            </a:xfrm>
+            <a:prstGeom prst="upArrow">
+              <a:avLst/>
+            </a:prstGeom>
+            <a:solidFill>
+              <a:srgbClr val="FF0000"/>
+            </a:solidFill>
+            <a:effectLst>
+              <a:outerShdw blurRad="50800" dist="38100" dir="18900000" algn="bl" rotWithShape="0">
+                <a:prstClr val="black">
+                  <a:alpha val="40000"/>
+                </a:prstClr>
+              </a:outerShdw>
+            </a:effectLst>
+          </p:spPr>
+          <p:style>
+            <a:lnRef idx="2">
+              <a:schemeClr val="accent1">
+                <a:shade val="15000"/>
+              </a:schemeClr>
+            </a:lnRef>
+            <a:fillRef idx="1">
+              <a:schemeClr val="accent1"/>
+            </a:fillRef>
+            <a:effectRef idx="0">
+              <a:schemeClr val="accent1"/>
+            </a:effectRef>
+            <a:fontRef idx="minor">
+              <a:schemeClr val="lt1"/>
+            </a:fontRef>
+          </p:style>
+          <p:txBody>
+            <a:bodyPr rtlCol="0" anchor="ctr"/>
+            <a:lstStyle/>
+            <a:p>
+              <a:pPr algn="ctr"/>
+              <a:endParaRPr lang="en-GB" dirty="0"/>
+            </a:p>
+          </p:txBody>
+        </p:sp>
+        <p:sp>
+          <p:nvSpPr>
+            <p:cNvPr id="15" name="Up Arrow 14">
+              <a:extLst>
+                <a:ext uri="{FF2B5EF4-FFF2-40B4-BE49-F238E27FC236}">
+                  <a16:creationId xmlns:a16="http://schemas.microsoft.com/office/drawing/2014/main" id="{82BD032E-4E4A-E5BA-23E8-2BF5F19C02D0}"/>
+                </a:ext>
+              </a:extLst>
+            </p:cNvPr>
+            <p:cNvSpPr/>
+            <p:nvPr/>
+          </p:nvSpPr>
+          <p:spPr>
+            <a:xfrm rot="2543695">
+              <a:off x="4998943" y="3088667"/>
+              <a:ext cx="306284" cy="588337"/>
+            </a:xfrm>
+            <a:prstGeom prst="upArrow">
+              <a:avLst/>
+            </a:prstGeom>
+            <a:solidFill>
+              <a:srgbClr val="FF0000"/>
+            </a:solidFill>
+            <a:effectLst>
+              <a:outerShdw blurRad="50800" dist="38100" dir="18900000" algn="bl" rotWithShape="0">
+                <a:prstClr val="black">
+                  <a:alpha val="40000"/>
+                </a:prstClr>
+              </a:outerShdw>
+            </a:effectLst>
+          </p:spPr>
+          <p:style>
+            <a:lnRef idx="2">
+              <a:schemeClr val="accent1">
+                <a:shade val="15000"/>
+              </a:schemeClr>
+            </a:lnRef>
+            <a:fillRef idx="1">
+              <a:schemeClr val="accent1"/>
+            </a:fillRef>
+            <a:effectRef idx="0">
+              <a:schemeClr val="accent1"/>
+            </a:effectRef>
+            <a:fontRef idx="minor">
+              <a:schemeClr val="lt1"/>
+            </a:fontRef>
+          </p:style>
+          <p:txBody>
+            <a:bodyPr rtlCol="0" anchor="ctr"/>
+            <a:lstStyle/>
+            <a:p>
+              <a:pPr algn="ctr"/>
+              <a:endParaRPr lang="en-GB" dirty="0"/>
+            </a:p>
+          </p:txBody>
+        </p:sp>
+        <p:sp>
+          <p:nvSpPr>
+            <p:cNvPr id="16" name="Up Arrow 15">
+              <a:extLst>
+                <a:ext uri="{FF2B5EF4-FFF2-40B4-BE49-F238E27FC236}">
+                  <a16:creationId xmlns:a16="http://schemas.microsoft.com/office/drawing/2014/main" id="{5541E3C3-88A2-C3FD-B68E-1B76B56A3AE0}"/>
+                </a:ext>
+              </a:extLst>
+            </p:cNvPr>
+            <p:cNvSpPr/>
+            <p:nvPr/>
+          </p:nvSpPr>
+          <p:spPr>
+            <a:xfrm rot="9305109">
+              <a:off x="7813805" y="3316664"/>
+              <a:ext cx="306284" cy="588337"/>
+            </a:xfrm>
+            <a:prstGeom prst="upArrow">
+              <a:avLst/>
+            </a:prstGeom>
+            <a:solidFill>
+              <a:srgbClr val="FF0000"/>
+            </a:solidFill>
+            <a:effectLst>
+              <a:outerShdw blurRad="50800" dist="38100" dir="18900000" algn="bl" rotWithShape="0">
+                <a:prstClr val="black">
+                  <a:alpha val="40000"/>
+                </a:prstClr>
+              </a:outerShdw>
+            </a:effectLst>
+          </p:spPr>
+          <p:style>
+            <a:lnRef idx="2">
+              <a:schemeClr val="accent1">
+                <a:shade val="15000"/>
+              </a:schemeClr>
+            </a:lnRef>
+            <a:fillRef idx="1">
+              <a:schemeClr val="accent1"/>
+            </a:fillRef>
+            <a:effectRef idx="0">
+              <a:schemeClr val="accent1"/>
+            </a:effectRef>
+            <a:fontRef idx="minor">
+              <a:schemeClr val="lt1"/>
+            </a:fontRef>
+          </p:style>
+          <p:txBody>
+            <a:bodyPr rtlCol="0" anchor="ctr"/>
+            <a:lstStyle/>
+            <a:p>
+              <a:pPr algn="ctr"/>
+              <a:endParaRPr lang="en-GB" dirty="0"/>
+            </a:p>
+          </p:txBody>
+        </p:sp>
+        <p:sp>
+          <p:nvSpPr>
+            <p:cNvPr id="17" name="Up Arrow 16">
+              <a:extLst>
+                <a:ext uri="{FF2B5EF4-FFF2-40B4-BE49-F238E27FC236}">
+                  <a16:creationId xmlns:a16="http://schemas.microsoft.com/office/drawing/2014/main" id="{4AA3BB3D-DC7A-8CE9-4649-BD12AB203F29}"/>
+                </a:ext>
+              </a:extLst>
+            </p:cNvPr>
+            <p:cNvSpPr/>
+            <p:nvPr/>
+          </p:nvSpPr>
+          <p:spPr>
+            <a:xfrm rot="12968911">
+              <a:off x="7734575" y="4441860"/>
+              <a:ext cx="306284" cy="588337"/>
+            </a:xfrm>
+            <a:prstGeom prst="upArrow">
+              <a:avLst/>
+            </a:prstGeom>
+            <a:solidFill>
+              <a:srgbClr val="FF0000"/>
+            </a:solidFill>
+            <a:effectLst>
+              <a:outerShdw blurRad="50800" dist="38100" dir="18900000" algn="bl" rotWithShape="0">
+                <a:prstClr val="black">
+                  <a:alpha val="40000"/>
+                </a:prstClr>
+              </a:outerShdw>
+            </a:effectLst>
+          </p:spPr>
+          <p:style>
+            <a:lnRef idx="2">
+              <a:schemeClr val="accent1">
+                <a:shade val="15000"/>
+              </a:schemeClr>
+            </a:lnRef>
+            <a:fillRef idx="1">
+              <a:schemeClr val="accent1"/>
+            </a:fillRef>
+            <a:effectRef idx="0">
+              <a:schemeClr val="accent1"/>
+            </a:effectRef>
+            <a:fontRef idx="minor">
+              <a:schemeClr val="lt1"/>
+            </a:fontRef>
+          </p:style>
+          <p:txBody>
+            <a:bodyPr rtlCol="0" anchor="ctr"/>
+            <a:lstStyle/>
+            <a:p>
+              <a:pPr algn="ctr"/>
+              <a:endParaRPr lang="en-GB" dirty="0"/>
+            </a:p>
+          </p:txBody>
+        </p:sp>
+        <p:sp>
+          <p:nvSpPr>
+            <p:cNvPr id="18" name="Up Arrow 17">
+              <a:extLst>
+                <a:ext uri="{FF2B5EF4-FFF2-40B4-BE49-F238E27FC236}">
+                  <a16:creationId xmlns:a16="http://schemas.microsoft.com/office/drawing/2014/main" id="{8BC8B4CD-1DB9-CF86-E0ED-F5F1C58AB251}"/>
+                </a:ext>
+              </a:extLst>
+            </p:cNvPr>
+            <p:cNvSpPr/>
+            <p:nvPr/>
+          </p:nvSpPr>
+          <p:spPr>
+            <a:xfrm rot="16200000">
+              <a:off x="6648173" y="4875364"/>
+              <a:ext cx="306284" cy="588337"/>
+            </a:xfrm>
+            <a:prstGeom prst="upArrow">
+              <a:avLst/>
+            </a:prstGeom>
+            <a:solidFill>
+              <a:srgbClr val="FF0000"/>
+            </a:solidFill>
+            <a:effectLst>
+              <a:outerShdw blurRad="50800" dist="38100" dir="18900000" algn="bl" rotWithShape="0">
+                <a:prstClr val="black">
+                  <a:alpha val="40000"/>
+                </a:prstClr>
+              </a:outerShdw>
+            </a:effectLst>
+          </p:spPr>
+          <p:style>
+            <a:lnRef idx="2">
+              <a:schemeClr val="accent1">
+                <a:shade val="15000"/>
+              </a:schemeClr>
+            </a:lnRef>
+            <a:fillRef idx="1">
+              <a:schemeClr val="accent1"/>
+            </a:fillRef>
+            <a:effectRef idx="0">
+              <a:schemeClr val="accent1"/>
+            </a:effectRef>
+            <a:fontRef idx="minor">
+              <a:schemeClr val="lt1"/>
+            </a:fontRef>
+          </p:style>
+          <p:txBody>
+            <a:bodyPr rtlCol="0" anchor="ctr"/>
+            <a:lstStyle/>
+            <a:p>
+              <a:pPr algn="ctr"/>
+              <a:endParaRPr lang="en-GB" dirty="0"/>
+            </a:p>
+          </p:txBody>
+        </p:sp>
+        <p:sp>
+          <p:nvSpPr>
+            <p:cNvPr id="19" name="Up Arrow 18">
+              <a:extLst>
+                <a:ext uri="{FF2B5EF4-FFF2-40B4-BE49-F238E27FC236}">
+                  <a16:creationId xmlns:a16="http://schemas.microsoft.com/office/drawing/2014/main" id="{FA899D80-978C-76E5-4965-339BD0653FA4}"/>
+                </a:ext>
+              </a:extLst>
+            </p:cNvPr>
+            <p:cNvSpPr/>
+            <p:nvPr/>
+          </p:nvSpPr>
+          <p:spPr>
+            <a:xfrm rot="16961279">
+              <a:off x="5460432" y="4785027"/>
+              <a:ext cx="306284" cy="588337"/>
+            </a:xfrm>
+            <a:prstGeom prst="upArrow">
+              <a:avLst/>
+            </a:prstGeom>
+            <a:solidFill>
+              <a:srgbClr val="FF0000"/>
+            </a:solidFill>
+            <a:effectLst>
+              <a:outerShdw blurRad="50800" dist="38100" dir="18900000" algn="bl" rotWithShape="0">
+                <a:prstClr val="black">
+                  <a:alpha val="40000"/>
+                </a:prstClr>
+              </a:outerShdw>
+            </a:effectLst>
+          </p:spPr>
+          <p:style>
+            <a:lnRef idx="2">
+              <a:schemeClr val="accent1">
+                <a:shade val="15000"/>
+              </a:schemeClr>
+            </a:lnRef>
+            <a:fillRef idx="1">
+              <a:schemeClr val="accent1"/>
+            </a:fillRef>
+            <a:effectRef idx="0">
+              <a:schemeClr val="accent1"/>
+            </a:effectRef>
+            <a:fontRef idx="minor">
+              <a:schemeClr val="lt1"/>
+            </a:fontRef>
+          </p:style>
+          <p:txBody>
+            <a:bodyPr rtlCol="0" anchor="ctr"/>
+            <a:lstStyle/>
+            <a:p>
+              <a:pPr algn="ctr"/>
+              <a:endParaRPr lang="en-GB" dirty="0"/>
+            </a:p>
+          </p:txBody>
+        </p:sp>
+        <p:sp>
+          <p:nvSpPr>
+            <p:cNvPr id="20" name="Up Arrow 19">
+              <a:extLst>
+                <a:ext uri="{FF2B5EF4-FFF2-40B4-BE49-F238E27FC236}">
+                  <a16:creationId xmlns:a16="http://schemas.microsoft.com/office/drawing/2014/main" id="{68F09A68-4D02-E652-3BCF-69439EE67DD1}"/>
+                </a:ext>
+              </a:extLst>
+            </p:cNvPr>
+            <p:cNvSpPr/>
+            <p:nvPr/>
+          </p:nvSpPr>
+          <p:spPr>
+            <a:xfrm rot="21040936">
+              <a:off x="4628837" y="4094584"/>
+              <a:ext cx="306284" cy="588337"/>
+            </a:xfrm>
+            <a:prstGeom prst="upArrow">
+              <a:avLst/>
+            </a:prstGeom>
+            <a:solidFill>
+              <a:srgbClr val="FF0000"/>
+            </a:solidFill>
+            <a:effectLst>
+              <a:outerShdw blurRad="50800" dist="38100" dir="18900000" algn="bl" rotWithShape="0">
+                <a:prstClr val="black">
+                  <a:alpha val="40000"/>
+                </a:prstClr>
+              </a:outerShdw>
+            </a:effectLst>
+          </p:spPr>
+          <p:style>
+            <a:lnRef idx="2">
+              <a:schemeClr val="accent1">
+                <a:shade val="15000"/>
+              </a:schemeClr>
+            </a:lnRef>
+            <a:fillRef idx="1">
+              <a:schemeClr val="accent1"/>
+            </a:fillRef>
+            <a:effectRef idx="0">
+              <a:schemeClr val="accent1"/>
+            </a:effectRef>
+            <a:fontRef idx="minor">
+              <a:schemeClr val="lt1"/>
+            </a:fontRef>
+          </p:style>
+          <p:txBody>
+            <a:bodyPr rtlCol="0" anchor="ctr"/>
+            <a:lstStyle/>
+            <a:p>
+              <a:pPr algn="ctr"/>
+              <a:endParaRPr lang="en-GB" dirty="0"/>
+            </a:p>
+          </p:txBody>
+        </p:sp>
+      </p:grpSp>
+    </p:spTree>
+    <p:extLst>
+      <p:ext uri="{BB962C8B-B14F-4D97-AF65-F5344CB8AC3E}">
+        <p14:creationId xmlns:p14="http://schemas.microsoft.com/office/powerpoint/2010/main" val="2946460275"/>
+      </p:ext>
+    </p:extLst>
+  </p:cSld>
+  <p:clrMapOvr>
+    <a:masterClrMapping/>
+  </p:clrMapOvr>
+</p:sld>
+</file>
+
 <file path=ppt/theme/theme1.xml><?xml version="1.0" encoding="utf-8"?>
 <a:theme xmlns:a="http://schemas.openxmlformats.org/drawingml/2006/main" name="Office Theme">
   <a:themeElements>

</xml_diff>

<commit_message>
Added Cartesian topology image.
</commit_message>
<xml_diff>
--- a/imgs/images.pptx
+++ b/imgs/images.pptx
@@ -5,13 +5,14 @@
     <p:sldMasterId id="2147483648" r:id="rId1"/>
   </p:sldMasterIdLst>
   <p:notesMasterIdLst>
-    <p:notesMasterId r:id="rId6"/>
+    <p:notesMasterId r:id="rId7"/>
   </p:notesMasterIdLst>
   <p:sldIdLst>
     <p:sldId id="256" r:id="rId2"/>
     <p:sldId id="257" r:id="rId3"/>
     <p:sldId id="258" r:id="rId4"/>
     <p:sldId id="259" r:id="rId5"/>
+    <p:sldId id="260" r:id="rId6"/>
   </p:sldIdLst>
   <p:sldSz cx="12192000" cy="6858000"/>
   <p:notesSz cx="6858000" cy="9144000"/>
@@ -6344,6 +6345,778 @@
 </p:sld>
 </file>
 
+<file path=ppt/slides/slide5.xml><?xml version="1.0" encoding="utf-8"?>
+<p:sld xmlns:a="http://schemas.openxmlformats.org/drawingml/2006/main" xmlns:r="http://schemas.openxmlformats.org/officeDocument/2006/relationships" xmlns:p="http://schemas.openxmlformats.org/presentationml/2006/main">
+  <p:cSld>
+    <p:spTree>
+      <p:nvGrpSpPr>
+        <p:cNvPr id="1" name=""/>
+        <p:cNvGrpSpPr/>
+        <p:nvPr/>
+      </p:nvGrpSpPr>
+      <p:grpSpPr>
+        <a:xfrm>
+          <a:off x="0" y="0"/>
+          <a:ext cx="0" cy="0"/>
+          <a:chOff x="0" y="0"/>
+          <a:chExt cx="0" cy="0"/>
+        </a:xfrm>
+      </p:grpSpPr>
+      <p:grpSp>
+        <p:nvGrpSpPr>
+          <p:cNvPr id="47" name="Group 46">
+            <a:extLst>
+              <a:ext uri="{FF2B5EF4-FFF2-40B4-BE49-F238E27FC236}">
+                <a16:creationId xmlns:a16="http://schemas.microsoft.com/office/drawing/2014/main" id="{75DECBAA-567B-7EF2-D045-481B4AC42428}"/>
+              </a:ext>
+            </a:extLst>
+          </p:cNvPr>
+          <p:cNvGrpSpPr/>
+          <p:nvPr/>
+        </p:nvGrpSpPr>
+        <p:grpSpPr>
+          <a:xfrm>
+            <a:off x="4149036" y="1331195"/>
+            <a:ext cx="4398393" cy="3840644"/>
+            <a:chOff x="4149036" y="1331195"/>
+            <a:chExt cx="4398393" cy="3840644"/>
+          </a:xfrm>
+        </p:grpSpPr>
+        <p:sp>
+          <p:nvSpPr>
+            <p:cNvPr id="5" name="Rectangle 4">
+              <a:extLst>
+                <a:ext uri="{FF2B5EF4-FFF2-40B4-BE49-F238E27FC236}">
+                  <a16:creationId xmlns:a16="http://schemas.microsoft.com/office/drawing/2014/main" id="{FDBCF216-F42F-42B1-69B4-523B65D5B171}"/>
+                </a:ext>
+              </a:extLst>
+            </p:cNvPr>
+            <p:cNvSpPr/>
+            <p:nvPr/>
+          </p:nvSpPr>
+          <p:spPr>
+            <a:xfrm>
+              <a:off x="4149036" y="1331195"/>
+              <a:ext cx="4295554" cy="3437861"/>
+            </a:xfrm>
+            <a:prstGeom prst="rect">
+              <a:avLst/>
+            </a:prstGeom>
+          </p:spPr>
+          <p:style>
+            <a:lnRef idx="2">
+              <a:schemeClr val="accent1">
+                <a:shade val="15000"/>
+              </a:schemeClr>
+            </a:lnRef>
+            <a:fillRef idx="1">
+              <a:schemeClr val="accent1"/>
+            </a:fillRef>
+            <a:effectRef idx="0">
+              <a:schemeClr val="accent1"/>
+            </a:effectRef>
+            <a:fontRef idx="minor">
+              <a:schemeClr val="lt1"/>
+            </a:fontRef>
+          </p:style>
+          <p:txBody>
+            <a:bodyPr rtlCol="0" anchor="ctr"/>
+            <a:lstStyle/>
+            <a:p>
+              <a:pPr algn="ctr"/>
+              <a:endParaRPr lang="en-GB"/>
+            </a:p>
+          </p:txBody>
+        </p:sp>
+        <p:sp>
+          <p:nvSpPr>
+            <p:cNvPr id="14" name="TextBox 13">
+              <a:extLst>
+                <a:ext uri="{FF2B5EF4-FFF2-40B4-BE49-F238E27FC236}">
+                  <a16:creationId xmlns:a16="http://schemas.microsoft.com/office/drawing/2014/main" id="{6D27F5D9-68E7-1B44-A576-3610E0B1FE43}"/>
+                </a:ext>
+              </a:extLst>
+            </p:cNvPr>
+            <p:cNvSpPr txBox="1"/>
+            <p:nvPr/>
+          </p:nvSpPr>
+          <p:spPr>
+            <a:xfrm>
+              <a:off x="6296813" y="4802507"/>
+              <a:ext cx="2250616" cy="369332"/>
+            </a:xfrm>
+            <a:prstGeom prst="rect">
+              <a:avLst/>
+            </a:prstGeom>
+            <a:noFill/>
+          </p:spPr>
+          <p:txBody>
+            <a:bodyPr wrap="none" rtlCol="0">
+              <a:spAutoFit/>
+            </a:bodyPr>
+            <a:lstStyle/>
+            <a:p>
+              <a:r>
+                <a:rPr lang="en-GB" dirty="0"/>
+                <a:t>MPI_COMM_WORLD</a:t>
+              </a:r>
+            </a:p>
+          </p:txBody>
+        </p:sp>
+        <p:grpSp>
+          <p:nvGrpSpPr>
+            <p:cNvPr id="44" name="Group 43">
+              <a:extLst>
+                <a:ext uri="{FF2B5EF4-FFF2-40B4-BE49-F238E27FC236}">
+                  <a16:creationId xmlns:a16="http://schemas.microsoft.com/office/drawing/2014/main" id="{18B823A5-4D9B-23E8-58EE-39B230D58F04}"/>
+                </a:ext>
+              </a:extLst>
+            </p:cNvPr>
+            <p:cNvGrpSpPr/>
+            <p:nvPr/>
+          </p:nvGrpSpPr>
+          <p:grpSpPr>
+            <a:xfrm>
+              <a:off x="4507009" y="1498692"/>
+              <a:ext cx="3579608" cy="2917027"/>
+              <a:chOff x="4443625" y="1571844"/>
+              <a:chExt cx="3579608" cy="2917027"/>
+            </a:xfrm>
+          </p:grpSpPr>
+          <p:sp>
+            <p:nvSpPr>
+              <p:cNvPr id="23" name="Rectangle 22">
+                <a:extLst>
+                  <a:ext uri="{FF2B5EF4-FFF2-40B4-BE49-F238E27FC236}">
+                    <a16:creationId xmlns:a16="http://schemas.microsoft.com/office/drawing/2014/main" id="{F70A759C-F243-C1E5-2BD3-BDC33835B3FA}"/>
+                  </a:ext>
+                </a:extLst>
+              </p:cNvPr>
+              <p:cNvSpPr/>
+              <p:nvPr/>
+            </p:nvSpPr>
+            <p:spPr>
+              <a:xfrm>
+                <a:off x="4443625" y="1571844"/>
+                <a:ext cx="3579608" cy="2917027"/>
+              </a:xfrm>
+              <a:prstGeom prst="rect">
+                <a:avLst/>
+              </a:prstGeom>
+              <a:solidFill>
+                <a:srgbClr val="FFFF00"/>
+              </a:solidFill>
+            </p:spPr>
+            <p:style>
+              <a:lnRef idx="2">
+                <a:schemeClr val="accent1">
+                  <a:shade val="15000"/>
+                </a:schemeClr>
+              </a:lnRef>
+              <a:fillRef idx="1">
+                <a:schemeClr val="accent1"/>
+              </a:fillRef>
+              <a:effectRef idx="0">
+                <a:schemeClr val="accent1"/>
+              </a:effectRef>
+              <a:fontRef idx="minor">
+                <a:schemeClr val="lt1"/>
+              </a:fontRef>
+            </p:style>
+            <p:txBody>
+              <a:bodyPr rtlCol="0" anchor="ctr"/>
+              <a:lstStyle/>
+              <a:p>
+                <a:pPr algn="ctr"/>
+                <a:endParaRPr lang="en-GB"/>
+              </a:p>
+            </p:txBody>
+          </p:sp>
+          <p:sp>
+            <p:nvSpPr>
+              <p:cNvPr id="6" name="Oval 5">
+                <a:extLst>
+                  <a:ext uri="{FF2B5EF4-FFF2-40B4-BE49-F238E27FC236}">
+                    <a16:creationId xmlns:a16="http://schemas.microsoft.com/office/drawing/2014/main" id="{16599FAC-1209-F133-5627-4883FDCC5370}"/>
+                  </a:ext>
+                </a:extLst>
+              </p:cNvPr>
+              <p:cNvSpPr/>
+              <p:nvPr/>
+            </p:nvSpPr>
+            <p:spPr>
+              <a:xfrm>
+                <a:off x="4679161" y="1905761"/>
+                <a:ext cx="503274" cy="439479"/>
+              </a:xfrm>
+              <a:prstGeom prst="ellipse">
+                <a:avLst/>
+              </a:prstGeom>
+              <a:solidFill>
+                <a:srgbClr val="FF0000"/>
+              </a:solidFill>
+              <a:effectLst>
+                <a:outerShdw blurRad="50800" dist="38100" dir="18900000" algn="bl" rotWithShape="0">
+                  <a:prstClr val="black">
+                    <a:alpha val="40000"/>
+                  </a:prstClr>
+                </a:outerShdw>
+              </a:effectLst>
+            </p:spPr>
+            <p:style>
+              <a:lnRef idx="2">
+                <a:schemeClr val="accent1">
+                  <a:shade val="15000"/>
+                </a:schemeClr>
+              </a:lnRef>
+              <a:fillRef idx="1">
+                <a:schemeClr val="accent1"/>
+              </a:fillRef>
+              <a:effectRef idx="0">
+                <a:schemeClr val="accent1"/>
+              </a:effectRef>
+              <a:fontRef idx="minor">
+                <a:schemeClr val="lt1"/>
+              </a:fontRef>
+            </p:style>
+            <p:txBody>
+              <a:bodyPr rtlCol="0" anchor="ctr"/>
+              <a:lstStyle/>
+              <a:p>
+                <a:pPr algn="ctr"/>
+                <a:r>
+                  <a:rPr lang="en-GB" dirty="0"/>
+                  <a:t>0</a:t>
+                </a:r>
+              </a:p>
+            </p:txBody>
+          </p:sp>
+          <p:sp>
+            <p:nvSpPr>
+              <p:cNvPr id="7" name="Oval 6">
+                <a:extLst>
+                  <a:ext uri="{FF2B5EF4-FFF2-40B4-BE49-F238E27FC236}">
+                    <a16:creationId xmlns:a16="http://schemas.microsoft.com/office/drawing/2014/main" id="{004F516F-C4F4-081A-D3A3-A2519E50079C}"/>
+                  </a:ext>
+                </a:extLst>
+              </p:cNvPr>
+              <p:cNvSpPr/>
+              <p:nvPr/>
+            </p:nvSpPr>
+            <p:spPr>
+              <a:xfrm>
+                <a:off x="7160960" y="1905761"/>
+                <a:ext cx="503274" cy="439479"/>
+              </a:xfrm>
+              <a:prstGeom prst="ellipse">
+                <a:avLst/>
+              </a:prstGeom>
+              <a:solidFill>
+                <a:srgbClr val="FF0000"/>
+              </a:solidFill>
+              <a:effectLst>
+                <a:outerShdw blurRad="50800" dist="38100" dir="18900000" algn="bl" rotWithShape="0">
+                  <a:prstClr val="black">
+                    <a:alpha val="40000"/>
+                  </a:prstClr>
+                </a:outerShdw>
+              </a:effectLst>
+            </p:spPr>
+            <p:style>
+              <a:lnRef idx="2">
+                <a:schemeClr val="accent1">
+                  <a:shade val="15000"/>
+                </a:schemeClr>
+              </a:lnRef>
+              <a:fillRef idx="1">
+                <a:schemeClr val="accent1"/>
+              </a:fillRef>
+              <a:effectRef idx="0">
+                <a:schemeClr val="accent1"/>
+              </a:effectRef>
+              <a:fontRef idx="minor">
+                <a:schemeClr val="lt1"/>
+              </a:fontRef>
+            </p:style>
+            <p:txBody>
+              <a:bodyPr rtlCol="0" anchor="ctr"/>
+              <a:lstStyle/>
+              <a:p>
+                <a:pPr algn="ctr"/>
+                <a:r>
+                  <a:rPr lang="en-GB" dirty="0"/>
+                  <a:t>2</a:t>
+                </a:r>
+              </a:p>
+            </p:txBody>
+          </p:sp>
+          <p:sp>
+            <p:nvSpPr>
+              <p:cNvPr id="8" name="Oval 7">
+                <a:extLst>
+                  <a:ext uri="{FF2B5EF4-FFF2-40B4-BE49-F238E27FC236}">
+                    <a16:creationId xmlns:a16="http://schemas.microsoft.com/office/drawing/2014/main" id="{630C2B45-7555-79C5-032E-8ADB65679BC1}"/>
+                  </a:ext>
+                </a:extLst>
+              </p:cNvPr>
+              <p:cNvSpPr/>
+              <p:nvPr/>
+            </p:nvSpPr>
+            <p:spPr>
+              <a:xfrm>
+                <a:off x="4679161" y="2951354"/>
+                <a:ext cx="503274" cy="439479"/>
+              </a:xfrm>
+              <a:prstGeom prst="ellipse">
+                <a:avLst/>
+              </a:prstGeom>
+              <a:solidFill>
+                <a:srgbClr val="FF0000"/>
+              </a:solidFill>
+              <a:effectLst>
+                <a:outerShdw blurRad="50800" dist="38100" dir="18900000" algn="bl" rotWithShape="0">
+                  <a:prstClr val="black">
+                    <a:alpha val="40000"/>
+                  </a:prstClr>
+                </a:outerShdw>
+              </a:effectLst>
+            </p:spPr>
+            <p:style>
+              <a:lnRef idx="2">
+                <a:schemeClr val="accent1">
+                  <a:shade val="15000"/>
+                </a:schemeClr>
+              </a:lnRef>
+              <a:fillRef idx="1">
+                <a:schemeClr val="accent1"/>
+              </a:fillRef>
+              <a:effectRef idx="0">
+                <a:schemeClr val="accent1"/>
+              </a:effectRef>
+              <a:fontRef idx="minor">
+                <a:schemeClr val="lt1"/>
+              </a:fontRef>
+            </p:style>
+            <p:txBody>
+              <a:bodyPr rtlCol="0" anchor="ctr"/>
+              <a:lstStyle/>
+              <a:p>
+                <a:pPr algn="ctr"/>
+                <a:r>
+                  <a:rPr lang="en-GB" dirty="0"/>
+                  <a:t>3</a:t>
+                </a:r>
+              </a:p>
+            </p:txBody>
+          </p:sp>
+          <p:sp>
+            <p:nvSpPr>
+              <p:cNvPr id="9" name="Oval 8">
+                <a:extLst>
+                  <a:ext uri="{FF2B5EF4-FFF2-40B4-BE49-F238E27FC236}">
+                    <a16:creationId xmlns:a16="http://schemas.microsoft.com/office/drawing/2014/main" id="{20100E78-C6CF-6813-C203-07BF893E4EE5}"/>
+                  </a:ext>
+                </a:extLst>
+              </p:cNvPr>
+              <p:cNvSpPr/>
+              <p:nvPr/>
+            </p:nvSpPr>
+            <p:spPr>
+              <a:xfrm>
+                <a:off x="5921244" y="2951354"/>
+                <a:ext cx="503274" cy="439479"/>
+              </a:xfrm>
+              <a:prstGeom prst="ellipse">
+                <a:avLst/>
+              </a:prstGeom>
+              <a:solidFill>
+                <a:srgbClr val="FF0000"/>
+              </a:solidFill>
+              <a:effectLst>
+                <a:outerShdw blurRad="50800" dist="38100" dir="18900000" algn="bl" rotWithShape="0">
+                  <a:prstClr val="black">
+                    <a:alpha val="40000"/>
+                  </a:prstClr>
+                </a:outerShdw>
+              </a:effectLst>
+            </p:spPr>
+            <p:style>
+              <a:lnRef idx="2">
+                <a:schemeClr val="accent1">
+                  <a:shade val="15000"/>
+                </a:schemeClr>
+              </a:lnRef>
+              <a:fillRef idx="1">
+                <a:schemeClr val="accent1"/>
+              </a:fillRef>
+              <a:effectRef idx="0">
+                <a:schemeClr val="accent1"/>
+              </a:effectRef>
+              <a:fontRef idx="minor">
+                <a:schemeClr val="lt1"/>
+              </a:fontRef>
+            </p:style>
+            <p:txBody>
+              <a:bodyPr rtlCol="0" anchor="ctr"/>
+              <a:lstStyle/>
+              <a:p>
+                <a:pPr algn="ctr"/>
+                <a:r>
+                  <a:rPr lang="en-GB" dirty="0"/>
+                  <a:t>4</a:t>
+                </a:r>
+              </a:p>
+            </p:txBody>
+          </p:sp>
+          <p:sp>
+            <p:nvSpPr>
+              <p:cNvPr id="10" name="Oval 9">
+                <a:extLst>
+                  <a:ext uri="{FF2B5EF4-FFF2-40B4-BE49-F238E27FC236}">
+                    <a16:creationId xmlns:a16="http://schemas.microsoft.com/office/drawing/2014/main" id="{2BE3E59E-9479-8FF8-EB6F-CA7AADA1D131}"/>
+                  </a:ext>
+                </a:extLst>
+              </p:cNvPr>
+              <p:cNvSpPr/>
+              <p:nvPr/>
+            </p:nvSpPr>
+            <p:spPr>
+              <a:xfrm>
+                <a:off x="7160960" y="2951354"/>
+                <a:ext cx="503274" cy="439479"/>
+              </a:xfrm>
+              <a:prstGeom prst="ellipse">
+                <a:avLst/>
+              </a:prstGeom>
+              <a:solidFill>
+                <a:srgbClr val="FF0000"/>
+              </a:solidFill>
+              <a:effectLst>
+                <a:outerShdw blurRad="50800" dist="38100" dir="18900000" algn="bl" rotWithShape="0">
+                  <a:prstClr val="black">
+                    <a:alpha val="40000"/>
+                  </a:prstClr>
+                </a:outerShdw>
+              </a:effectLst>
+            </p:spPr>
+            <p:style>
+              <a:lnRef idx="2">
+                <a:schemeClr val="accent1">
+                  <a:shade val="15000"/>
+                </a:schemeClr>
+              </a:lnRef>
+              <a:fillRef idx="1">
+                <a:schemeClr val="accent1"/>
+              </a:fillRef>
+              <a:effectRef idx="0">
+                <a:schemeClr val="accent1"/>
+              </a:effectRef>
+              <a:fontRef idx="minor">
+                <a:schemeClr val="lt1"/>
+              </a:fontRef>
+            </p:style>
+            <p:txBody>
+              <a:bodyPr rtlCol="0" anchor="ctr"/>
+              <a:lstStyle/>
+              <a:p>
+                <a:pPr algn="ctr"/>
+                <a:r>
+                  <a:rPr lang="en-GB" dirty="0"/>
+                  <a:t>5</a:t>
+                </a:r>
+              </a:p>
+            </p:txBody>
+          </p:sp>
+          <p:sp>
+            <p:nvSpPr>
+              <p:cNvPr id="11" name="Oval 10">
+                <a:extLst>
+                  <a:ext uri="{FF2B5EF4-FFF2-40B4-BE49-F238E27FC236}">
+                    <a16:creationId xmlns:a16="http://schemas.microsoft.com/office/drawing/2014/main" id="{4AD566B2-1248-18F4-5322-9083F9B443FF}"/>
+                  </a:ext>
+                </a:extLst>
+              </p:cNvPr>
+              <p:cNvSpPr/>
+              <p:nvPr/>
+            </p:nvSpPr>
+            <p:spPr>
+              <a:xfrm>
+                <a:off x="5921244" y="1905761"/>
+                <a:ext cx="503274" cy="439479"/>
+              </a:xfrm>
+              <a:prstGeom prst="ellipse">
+                <a:avLst/>
+              </a:prstGeom>
+              <a:solidFill>
+                <a:srgbClr val="FF0000"/>
+              </a:solidFill>
+              <a:effectLst>
+                <a:outerShdw blurRad="50800" dist="38100" dir="18900000" algn="bl" rotWithShape="0">
+                  <a:prstClr val="black">
+                    <a:alpha val="40000"/>
+                  </a:prstClr>
+                </a:outerShdw>
+              </a:effectLst>
+            </p:spPr>
+            <p:style>
+              <a:lnRef idx="2">
+                <a:schemeClr val="accent1">
+                  <a:shade val="15000"/>
+                </a:schemeClr>
+              </a:lnRef>
+              <a:fillRef idx="1">
+                <a:schemeClr val="accent1"/>
+              </a:fillRef>
+              <a:effectRef idx="0">
+                <a:schemeClr val="accent1"/>
+              </a:effectRef>
+              <a:fontRef idx="minor">
+                <a:schemeClr val="lt1"/>
+              </a:fontRef>
+            </p:style>
+            <p:txBody>
+              <a:bodyPr rtlCol="0" anchor="ctr"/>
+              <a:lstStyle/>
+              <a:p>
+                <a:pPr algn="ctr"/>
+                <a:r>
+                  <a:rPr lang="en-GB" dirty="0"/>
+                  <a:t>1</a:t>
+                </a:r>
+              </a:p>
+            </p:txBody>
+          </p:sp>
+          <p:sp>
+            <p:nvSpPr>
+              <p:cNvPr id="12" name="Oval 11">
+                <a:extLst>
+                  <a:ext uri="{FF2B5EF4-FFF2-40B4-BE49-F238E27FC236}">
+                    <a16:creationId xmlns:a16="http://schemas.microsoft.com/office/drawing/2014/main" id="{AB8A6366-BFC8-1402-5DF4-A8F059BE37DE}"/>
+                  </a:ext>
+                </a:extLst>
+              </p:cNvPr>
+              <p:cNvSpPr/>
+              <p:nvPr/>
+            </p:nvSpPr>
+            <p:spPr>
+              <a:xfrm>
+                <a:off x="4679161" y="3850389"/>
+                <a:ext cx="503274" cy="519050"/>
+              </a:xfrm>
+              <a:prstGeom prst="ellipse">
+                <a:avLst/>
+              </a:prstGeom>
+              <a:solidFill>
+                <a:srgbClr val="FF0000"/>
+              </a:solidFill>
+              <a:effectLst>
+                <a:outerShdw blurRad="50800" dist="38100" dir="18900000" algn="bl" rotWithShape="0">
+                  <a:prstClr val="black">
+                    <a:alpha val="40000"/>
+                  </a:prstClr>
+                </a:outerShdw>
+              </a:effectLst>
+            </p:spPr>
+            <p:style>
+              <a:lnRef idx="2">
+                <a:schemeClr val="accent1">
+                  <a:shade val="15000"/>
+                </a:schemeClr>
+              </a:lnRef>
+              <a:fillRef idx="1">
+                <a:schemeClr val="accent1"/>
+              </a:fillRef>
+              <a:effectRef idx="0">
+                <a:schemeClr val="accent1"/>
+              </a:effectRef>
+              <a:fontRef idx="minor">
+                <a:schemeClr val="lt1"/>
+              </a:fontRef>
+            </p:style>
+            <p:txBody>
+              <a:bodyPr rtlCol="0" anchor="ctr"/>
+              <a:lstStyle/>
+              <a:p>
+                <a:pPr algn="ctr"/>
+                <a:r>
+                  <a:rPr lang="en-GB" dirty="0"/>
+                  <a:t>6</a:t>
+                </a:r>
+              </a:p>
+            </p:txBody>
+          </p:sp>
+          <p:sp>
+            <p:nvSpPr>
+              <p:cNvPr id="13" name="Oval 12">
+                <a:extLst>
+                  <a:ext uri="{FF2B5EF4-FFF2-40B4-BE49-F238E27FC236}">
+                    <a16:creationId xmlns:a16="http://schemas.microsoft.com/office/drawing/2014/main" id="{3D858937-0AB4-DBCA-279D-72747147F70A}"/>
+                  </a:ext>
+                </a:extLst>
+              </p:cNvPr>
+              <p:cNvSpPr/>
+              <p:nvPr/>
+            </p:nvSpPr>
+            <p:spPr>
+              <a:xfrm>
+                <a:off x="5921244" y="3929960"/>
+                <a:ext cx="503274" cy="439479"/>
+              </a:xfrm>
+              <a:prstGeom prst="ellipse">
+                <a:avLst/>
+              </a:prstGeom>
+              <a:solidFill>
+                <a:srgbClr val="FF0000"/>
+              </a:solidFill>
+              <a:effectLst>
+                <a:outerShdw blurRad="50800" dist="38100" dir="18900000" algn="bl" rotWithShape="0">
+                  <a:prstClr val="black">
+                    <a:alpha val="40000"/>
+                  </a:prstClr>
+                </a:outerShdw>
+              </a:effectLst>
+            </p:spPr>
+            <p:style>
+              <a:lnRef idx="2">
+                <a:schemeClr val="accent1">
+                  <a:shade val="15000"/>
+                </a:schemeClr>
+              </a:lnRef>
+              <a:fillRef idx="1">
+                <a:schemeClr val="accent1"/>
+              </a:fillRef>
+              <a:effectRef idx="0">
+                <a:schemeClr val="accent1"/>
+              </a:effectRef>
+              <a:fontRef idx="minor">
+                <a:schemeClr val="lt1"/>
+              </a:fontRef>
+            </p:style>
+            <p:txBody>
+              <a:bodyPr rtlCol="0" anchor="ctr"/>
+              <a:lstStyle/>
+              <a:p>
+                <a:pPr algn="ctr"/>
+                <a:r>
+                  <a:rPr lang="en-GB" dirty="0"/>
+                  <a:t>7</a:t>
+                </a:r>
+              </a:p>
+            </p:txBody>
+          </p:sp>
+          <p:sp>
+            <p:nvSpPr>
+              <p:cNvPr id="43" name="Oval 42">
+                <a:extLst>
+                  <a:ext uri="{FF2B5EF4-FFF2-40B4-BE49-F238E27FC236}">
+                    <a16:creationId xmlns:a16="http://schemas.microsoft.com/office/drawing/2014/main" id="{FE3BBB63-FE41-EBA1-59E8-5EB2748BF685}"/>
+                  </a:ext>
+                </a:extLst>
+              </p:cNvPr>
+              <p:cNvSpPr/>
+              <p:nvPr/>
+            </p:nvSpPr>
+            <p:spPr>
+              <a:xfrm>
+                <a:off x="7160960" y="3929960"/>
+                <a:ext cx="503274" cy="439479"/>
+              </a:xfrm>
+              <a:prstGeom prst="ellipse">
+                <a:avLst/>
+              </a:prstGeom>
+              <a:solidFill>
+                <a:srgbClr val="FF0000"/>
+              </a:solidFill>
+              <a:effectLst>
+                <a:outerShdw blurRad="50800" dist="38100" dir="18900000" algn="bl" rotWithShape="0">
+                  <a:prstClr val="black">
+                    <a:alpha val="40000"/>
+                  </a:prstClr>
+                </a:outerShdw>
+              </a:effectLst>
+            </p:spPr>
+            <p:style>
+              <a:lnRef idx="2">
+                <a:schemeClr val="accent1">
+                  <a:shade val="15000"/>
+                </a:schemeClr>
+              </a:lnRef>
+              <a:fillRef idx="1">
+                <a:schemeClr val="accent1"/>
+              </a:fillRef>
+              <a:effectRef idx="0">
+                <a:schemeClr val="accent1"/>
+              </a:effectRef>
+              <a:fontRef idx="minor">
+                <a:schemeClr val="lt1"/>
+              </a:fontRef>
+            </p:style>
+            <p:txBody>
+              <a:bodyPr rtlCol="0" anchor="ctr"/>
+              <a:lstStyle/>
+              <a:p>
+                <a:pPr algn="ctr"/>
+                <a:r>
+                  <a:rPr lang="en-GB" dirty="0"/>
+                  <a:t>8</a:t>
+                </a:r>
+              </a:p>
+            </p:txBody>
+          </p:sp>
+        </p:grpSp>
+        <p:sp>
+          <p:nvSpPr>
+            <p:cNvPr id="46" name="TextBox 45">
+              <a:extLst>
+                <a:ext uri="{FF2B5EF4-FFF2-40B4-BE49-F238E27FC236}">
+                  <a16:creationId xmlns:a16="http://schemas.microsoft.com/office/drawing/2014/main" id="{FD785C34-BCA2-9D71-83FC-500BC155AB0C}"/>
+                </a:ext>
+              </a:extLst>
+            </p:cNvPr>
+            <p:cNvSpPr txBox="1"/>
+            <p:nvPr/>
+          </p:nvSpPr>
+          <p:spPr>
+            <a:xfrm>
+              <a:off x="6681668" y="4407722"/>
+              <a:ext cx="1524263" cy="369332"/>
+            </a:xfrm>
+            <a:prstGeom prst="rect">
+              <a:avLst/>
+            </a:prstGeom>
+            <a:noFill/>
+          </p:spPr>
+          <p:txBody>
+            <a:bodyPr wrap="none" rtlCol="0">
+              <a:spAutoFit/>
+            </a:bodyPr>
+            <a:lstStyle/>
+            <a:p>
+              <a:r>
+                <a:rPr lang="en-GB" dirty="0">
+                  <a:solidFill>
+                    <a:srgbClr val="FFFF00"/>
+                  </a:solidFill>
+                </a:rPr>
+                <a:t>COMM_CART</a:t>
+              </a:r>
+            </a:p>
+          </p:txBody>
+        </p:sp>
+      </p:grpSp>
+    </p:spTree>
+    <p:extLst>
+      <p:ext uri="{BB962C8B-B14F-4D97-AF65-F5344CB8AC3E}">
+        <p14:creationId xmlns:p14="http://schemas.microsoft.com/office/powerpoint/2010/main" val="456289790"/>
+      </p:ext>
+    </p:extLst>
+  </p:cSld>
+  <p:clrMapOvr>
+    <a:masterClrMapping/>
+  </p:clrMapOvr>
+</p:sld>
+</file>
+
 <file path=ppt/theme/theme1.xml><?xml version="1.0" encoding="utf-8"?>
 <a:theme xmlns:a="http://schemas.openxmlformats.org/drawingml/2006/main" name="Office Theme">
   <a:themeElements>

</xml_diff>